<commit_message>
Migliorata pres con spiegazione filtro complementare
</commit_message>
<xml_diff>
--- a/BikeActivity.pptx
+++ b/BikeActivity.pptx
@@ -10,6 +10,9 @@
     <p:sldId id="259" r:id="rId4"/>
     <p:sldId id="261" r:id="rId5"/>
     <p:sldId id="260" r:id="rId6"/>
+    <p:sldId id="263" r:id="rId7"/>
+    <p:sldId id="264" r:id="rId8"/>
+    <p:sldId id="262" r:id="rId9"/>
   </p:sldIdLst>
   <p:sldSz cx="12192000" cy="6858000"/>
   <p:notesSz cx="6858000" cy="9144000"/>
@@ -6377,6 +6380,2504 @@
 </p:sld>
 </file>
 
+<file path=ppt/slides/slide6.xml><?xml version="1.0" encoding="utf-8"?>
+<p:sld xmlns:a="http://schemas.openxmlformats.org/drawingml/2006/main" xmlns:r="http://schemas.openxmlformats.org/officeDocument/2006/relationships" xmlns:p="http://schemas.openxmlformats.org/presentationml/2006/main">
+  <p:cSld>
+    <p:bg>
+      <p:bgPr>
+        <a:solidFill>
+          <a:schemeClr val="bg1"/>
+        </a:solidFill>
+        <a:effectLst/>
+      </p:bgPr>
+    </p:bg>
+    <p:spTree>
+      <p:nvGrpSpPr>
+        <p:cNvPr id="1" name=""/>
+        <p:cNvGrpSpPr/>
+        <p:nvPr/>
+      </p:nvGrpSpPr>
+      <p:grpSpPr>
+        <a:xfrm>
+          <a:off x="0" y="0"/>
+          <a:ext cx="0" cy="0"/>
+          <a:chOff x="0" y="0"/>
+          <a:chExt cx="0" cy="0"/>
+        </a:xfrm>
+      </p:grpSpPr>
+      <p:sp useBgFill="1">
+        <p:nvSpPr>
+          <p:cNvPr id="8" name="Rectangle 7">
+            <a:extLst>
+              <a:ext uri="{FF2B5EF4-FFF2-40B4-BE49-F238E27FC236}">
+                <a16:creationId xmlns:a16="http://schemas.microsoft.com/office/drawing/2014/main" id="{1B15ED52-F352-441B-82BF-E0EA34836D08}"/>
+              </a:ext>
+              <a:ext uri="{C183D7F6-B498-43B3-948B-1728B52AA6E4}">
+                <adec:decorative xmlns:adec="http://schemas.microsoft.com/office/drawing/2017/decorative" val="1"/>
+              </a:ext>
+            </a:extLst>
+          </p:cNvPr>
+          <p:cNvSpPr>
+            <a:spLocks noGrp="1" noRot="1" noChangeAspect="1" noMove="1" noResize="1" noEditPoints="1" noAdjustHandles="1" noChangeArrowheads="1" noChangeShapeType="1" noTextEdit="1"/>
+          </p:cNvSpPr>
+          <p:nvPr>
+            <p:extLst>
+              <p:ext uri="{386F3935-93C4-4BCD-93E2-E3B085C9AB24}">
+                <p16:designElem xmlns:p16="http://schemas.microsoft.com/office/powerpoint/2015/main" val="1"/>
+              </p:ext>
+            </p:extLst>
+          </p:nvPr>
+        </p:nvSpPr>
+        <p:spPr>
+          <a:xfrm>
+            <a:off x="0" y="0"/>
+            <a:ext cx="12192000" cy="6858000"/>
+          </a:xfrm>
+          <a:prstGeom prst="rect">
+            <a:avLst/>
+          </a:prstGeom>
+          <a:ln w="12700" cap="flat" cmpd="sng" algn="ctr">
+            <a:noFill/>
+            <a:prstDash val="solid"/>
+            <a:miter lim="800000"/>
+          </a:ln>
+          <a:effectLst/>
+          <a:extLst>
+            <a:ext uri="{91240B29-F687-4F45-9708-019B960494DF}">
+              <a14:hiddenLine xmlns:a14="http://schemas.microsoft.com/office/drawing/2010/main" w="12700" cap="flat" cmpd="sng" algn="ctr">
+                <a:solidFill>
+                  <a:schemeClr val="accent1">
+                    <a:shade val="50000"/>
+                  </a:schemeClr>
+                </a:solidFill>
+                <a:prstDash val="solid"/>
+                <a:miter lim="800000"/>
+              </a14:hiddenLine>
+            </a:ext>
+          </a:extLst>
+        </p:spPr>
+        <p:style>
+          <a:lnRef idx="2">
+            <a:schemeClr val="accent1">
+              <a:shade val="50000"/>
+            </a:schemeClr>
+          </a:lnRef>
+          <a:fillRef idx="1">
+            <a:schemeClr val="accent1"/>
+          </a:fillRef>
+          <a:effectRef idx="0">
+            <a:schemeClr val="accent1"/>
+          </a:effectRef>
+          <a:fontRef idx="minor">
+            <a:schemeClr val="lt1"/>
+          </a:fontRef>
+        </p:style>
+        <p:txBody>
+          <a:bodyPr rtlCol="0" anchor="ctr"/>
+          <a:lstStyle/>
+          <a:p>
+            <a:pPr algn="ctr"/>
+            <a:endParaRPr lang="en-US"/>
+          </a:p>
+        </p:txBody>
+      </p:sp>
+      <p:sp>
+        <p:nvSpPr>
+          <p:cNvPr id="10" name="Rectangle 9">
+            <a:extLst>
+              <a:ext uri="{FF2B5EF4-FFF2-40B4-BE49-F238E27FC236}">
+                <a16:creationId xmlns:a16="http://schemas.microsoft.com/office/drawing/2014/main" id="{3B2E3793-BFE6-45A2-9B7B-E18844431C99}"/>
+              </a:ext>
+              <a:ext uri="{C183D7F6-B498-43B3-948B-1728B52AA6E4}">
+                <adec:decorative xmlns:adec="http://schemas.microsoft.com/office/drawing/2017/decorative" val="1"/>
+              </a:ext>
+            </a:extLst>
+          </p:cNvPr>
+          <p:cNvSpPr>
+            <a:spLocks noGrp="1" noRot="1" noChangeAspect="1" noMove="1" noResize="1" noEditPoints="1" noAdjustHandles="1" noChangeArrowheads="1" noChangeShapeType="1" noTextEdit="1"/>
+          </p:cNvSpPr>
+          <p:nvPr>
+            <p:extLst>
+              <p:ext uri="{386F3935-93C4-4BCD-93E2-E3B085C9AB24}">
+                <p16:designElem xmlns:p16="http://schemas.microsoft.com/office/powerpoint/2015/main" val="1"/>
+              </p:ext>
+            </p:extLst>
+          </p:nvPr>
+        </p:nvSpPr>
+        <p:spPr>
+          <a:xfrm flipH="1">
+            <a:off x="-1" y="-1"/>
+            <a:ext cx="12191998" cy="1590742"/>
+          </a:xfrm>
+          <a:prstGeom prst="rect">
+            <a:avLst/>
+          </a:prstGeom>
+          <a:gradFill>
+            <a:gsLst>
+              <a:gs pos="0">
+                <a:srgbClr val="000000"/>
+              </a:gs>
+              <a:gs pos="100000">
+                <a:schemeClr val="accent1">
+                  <a:lumMod val="75000"/>
+                </a:schemeClr>
+              </a:gs>
+            </a:gsLst>
+            <a:lin ang="8400000" scaled="0"/>
+          </a:gradFill>
+          <a:ln>
+            <a:noFill/>
+          </a:ln>
+        </p:spPr>
+        <p:style>
+          <a:lnRef idx="2">
+            <a:schemeClr val="accent1">
+              <a:shade val="50000"/>
+            </a:schemeClr>
+          </a:lnRef>
+          <a:fillRef idx="1">
+            <a:schemeClr val="accent1"/>
+          </a:fillRef>
+          <a:effectRef idx="0">
+            <a:schemeClr val="accent1"/>
+          </a:effectRef>
+          <a:fontRef idx="minor">
+            <a:schemeClr val="lt1"/>
+          </a:fontRef>
+        </p:style>
+        <p:txBody>
+          <a:bodyPr rtlCol="0" anchor="ctr"/>
+          <a:lstStyle/>
+          <a:p>
+            <a:pPr algn="ctr"/>
+            <a:endParaRPr lang="en-US"/>
+          </a:p>
+        </p:txBody>
+      </p:sp>
+      <p:sp>
+        <p:nvSpPr>
+          <p:cNvPr id="12" name="Rectangle 11">
+            <a:extLst>
+              <a:ext uri="{FF2B5EF4-FFF2-40B4-BE49-F238E27FC236}">
+                <a16:creationId xmlns:a16="http://schemas.microsoft.com/office/drawing/2014/main" id="{BC4C4868-CB8F-4AF9-9CDB-8108F2C19B67}"/>
+              </a:ext>
+              <a:ext uri="{C183D7F6-B498-43B3-948B-1728B52AA6E4}">
+                <adec:decorative xmlns:adec="http://schemas.microsoft.com/office/drawing/2017/decorative" val="1"/>
+              </a:ext>
+            </a:extLst>
+          </p:cNvPr>
+          <p:cNvSpPr>
+            <a:spLocks noGrp="1" noRot="1" noChangeAspect="1" noMove="1" noResize="1" noEditPoints="1" noAdjustHandles="1" noChangeArrowheads="1" noChangeShapeType="1" noTextEdit="1"/>
+          </p:cNvSpPr>
+          <p:nvPr>
+            <p:extLst>
+              <p:ext uri="{386F3935-93C4-4BCD-93E2-E3B085C9AB24}">
+                <p16:designElem xmlns:p16="http://schemas.microsoft.com/office/powerpoint/2015/main" val="1"/>
+              </p:ext>
+            </p:extLst>
+          </p:nvPr>
+        </p:nvSpPr>
+        <p:spPr>
+          <a:xfrm rot="10800000" flipH="1">
+            <a:off x="-3" y="0"/>
+            <a:ext cx="8115306" cy="1590742"/>
+          </a:xfrm>
+          <a:prstGeom prst="rect">
+            <a:avLst/>
+          </a:prstGeom>
+          <a:gradFill>
+            <a:gsLst>
+              <a:gs pos="20000">
+                <a:schemeClr val="accent1">
+                  <a:alpha val="0"/>
+                </a:schemeClr>
+              </a:gs>
+              <a:gs pos="100000">
+                <a:schemeClr val="accent1">
+                  <a:lumMod val="50000"/>
+                  <a:alpha val="55000"/>
+                </a:schemeClr>
+              </a:gs>
+            </a:gsLst>
+            <a:lin ang="13800000" scaled="0"/>
+          </a:gradFill>
+          <a:ln>
+            <a:noFill/>
+          </a:ln>
+        </p:spPr>
+        <p:style>
+          <a:lnRef idx="2">
+            <a:schemeClr val="accent1">
+              <a:shade val="50000"/>
+            </a:schemeClr>
+          </a:lnRef>
+          <a:fillRef idx="1">
+            <a:schemeClr val="accent1"/>
+          </a:fillRef>
+          <a:effectRef idx="0">
+            <a:schemeClr val="accent1"/>
+          </a:effectRef>
+          <a:fontRef idx="minor">
+            <a:schemeClr val="lt1"/>
+          </a:fontRef>
+        </p:style>
+        <p:txBody>
+          <a:bodyPr rtlCol="0" anchor="ctr"/>
+          <a:lstStyle/>
+          <a:p>
+            <a:pPr algn="ctr"/>
+            <a:endParaRPr lang="en-US"/>
+          </a:p>
+        </p:txBody>
+      </p:sp>
+      <p:sp>
+        <p:nvSpPr>
+          <p:cNvPr id="14" name="Rectangle 13">
+            <a:extLst>
+              <a:ext uri="{FF2B5EF4-FFF2-40B4-BE49-F238E27FC236}">
+                <a16:creationId xmlns:a16="http://schemas.microsoft.com/office/drawing/2014/main" id="{375E0459-6403-40CD-989D-56A4407CA12E}"/>
+              </a:ext>
+              <a:ext uri="{C183D7F6-B498-43B3-948B-1728B52AA6E4}">
+                <adec:decorative xmlns:adec="http://schemas.microsoft.com/office/drawing/2017/decorative" val="1"/>
+              </a:ext>
+            </a:extLst>
+          </p:cNvPr>
+          <p:cNvSpPr>
+            <a:spLocks noGrp="1" noRot="1" noChangeAspect="1" noMove="1" noResize="1" noEditPoints="1" noAdjustHandles="1" noChangeArrowheads="1" noChangeShapeType="1" noTextEdit="1"/>
+          </p:cNvSpPr>
+          <p:nvPr>
+            <p:extLst>
+              <p:ext uri="{386F3935-93C4-4BCD-93E2-E3B085C9AB24}">
+                <p16:designElem xmlns:p16="http://schemas.microsoft.com/office/powerpoint/2015/main" val="1"/>
+              </p:ext>
+            </p:extLst>
+          </p:nvPr>
+        </p:nvSpPr>
+        <p:spPr>
+          <a:xfrm flipH="1">
+            <a:off x="8115299" y="-1"/>
+            <a:ext cx="4076698" cy="1590742"/>
+          </a:xfrm>
+          <a:prstGeom prst="rect">
+            <a:avLst/>
+          </a:prstGeom>
+          <a:gradFill>
+            <a:gsLst>
+              <a:gs pos="0">
+                <a:schemeClr val="accent1">
+                  <a:alpha val="66000"/>
+                </a:schemeClr>
+              </a:gs>
+              <a:gs pos="100000">
+                <a:srgbClr val="000000">
+                  <a:alpha val="30000"/>
+                </a:srgbClr>
+              </a:gs>
+            </a:gsLst>
+            <a:lin ang="13200000" scaled="0"/>
+          </a:gradFill>
+          <a:ln>
+            <a:noFill/>
+          </a:ln>
+        </p:spPr>
+        <p:style>
+          <a:lnRef idx="2">
+            <a:schemeClr val="accent1">
+              <a:shade val="50000"/>
+            </a:schemeClr>
+          </a:lnRef>
+          <a:fillRef idx="1">
+            <a:schemeClr val="accent1"/>
+          </a:fillRef>
+          <a:effectRef idx="0">
+            <a:schemeClr val="accent1"/>
+          </a:effectRef>
+          <a:fontRef idx="minor">
+            <a:schemeClr val="lt1"/>
+          </a:fontRef>
+        </p:style>
+        <p:txBody>
+          <a:bodyPr rtlCol="0" anchor="ctr"/>
+          <a:lstStyle/>
+          <a:p>
+            <a:pPr algn="ctr"/>
+            <a:endParaRPr lang="en-US"/>
+          </a:p>
+        </p:txBody>
+      </p:sp>
+      <p:sp>
+        <p:nvSpPr>
+          <p:cNvPr id="16" name="Rectangle 15">
+            <a:extLst>
+              <a:ext uri="{FF2B5EF4-FFF2-40B4-BE49-F238E27FC236}">
+                <a16:creationId xmlns:a16="http://schemas.microsoft.com/office/drawing/2014/main" id="{53E5B1A8-3AC9-4BD1-9BBC-78CA94F2D1BA}"/>
+              </a:ext>
+              <a:ext uri="{C183D7F6-B498-43B3-948B-1728B52AA6E4}">
+                <adec:decorative xmlns:adec="http://schemas.microsoft.com/office/drawing/2017/decorative" val="1"/>
+              </a:ext>
+            </a:extLst>
+          </p:cNvPr>
+          <p:cNvSpPr>
+            <a:spLocks noGrp="1" noRot="1" noChangeAspect="1" noMove="1" noResize="1" noEditPoints="1" noAdjustHandles="1" noChangeArrowheads="1" noChangeShapeType="1" noTextEdit="1"/>
+          </p:cNvSpPr>
+          <p:nvPr>
+            <p:extLst>
+              <p:ext uri="{386F3935-93C4-4BCD-93E2-E3B085C9AB24}">
+                <p16:designElem xmlns:p16="http://schemas.microsoft.com/office/powerpoint/2015/main" val="1"/>
+              </p:ext>
+            </p:extLst>
+          </p:nvPr>
+        </p:nvSpPr>
+        <p:spPr>
+          <a:xfrm>
+            <a:off x="459350" y="-1"/>
+            <a:ext cx="11732646" cy="1597433"/>
+          </a:xfrm>
+          <a:prstGeom prst="rect">
+            <a:avLst/>
+          </a:prstGeom>
+          <a:gradFill>
+            <a:gsLst>
+              <a:gs pos="50000">
+                <a:srgbClr val="000000">
+                  <a:alpha val="0"/>
+                </a:srgbClr>
+              </a:gs>
+              <a:gs pos="99000">
+                <a:schemeClr val="accent1">
+                  <a:lumMod val="50000"/>
+                  <a:alpha val="52000"/>
+                </a:schemeClr>
+              </a:gs>
+            </a:gsLst>
+            <a:lin ang="16800000" scaled="0"/>
+          </a:gradFill>
+          <a:ln>
+            <a:noFill/>
+          </a:ln>
+        </p:spPr>
+        <p:style>
+          <a:lnRef idx="2">
+            <a:schemeClr val="accent1">
+              <a:shade val="50000"/>
+            </a:schemeClr>
+          </a:lnRef>
+          <a:fillRef idx="1">
+            <a:schemeClr val="accent1"/>
+          </a:fillRef>
+          <a:effectRef idx="0">
+            <a:schemeClr val="accent1"/>
+          </a:effectRef>
+          <a:fontRef idx="minor">
+            <a:schemeClr val="lt1"/>
+          </a:fontRef>
+        </p:style>
+        <p:txBody>
+          <a:bodyPr rtlCol="0" anchor="ctr"/>
+          <a:lstStyle/>
+          <a:p>
+            <a:pPr algn="ctr"/>
+            <a:endParaRPr lang="en-US"/>
+          </a:p>
+        </p:txBody>
+      </p:sp>
+      <p:sp>
+        <p:nvSpPr>
+          <p:cNvPr id="2" name="Titolo 1">
+            <a:extLst>
+              <a:ext uri="{FF2B5EF4-FFF2-40B4-BE49-F238E27FC236}">
+                <a16:creationId xmlns:a16="http://schemas.microsoft.com/office/drawing/2014/main" id="{4FF6C779-3855-AE93-468A-1631A651CC6C}"/>
+              </a:ext>
+            </a:extLst>
+          </p:cNvPr>
+          <p:cNvSpPr>
+            <a:spLocks noGrp="1"/>
+          </p:cNvSpPr>
+          <p:nvPr>
+            <p:ph type="title"/>
+          </p:nvPr>
+        </p:nvSpPr>
+        <p:spPr>
+          <a:xfrm>
+            <a:off x="1371599" y="294538"/>
+            <a:ext cx="9895951" cy="1033669"/>
+          </a:xfrm>
+        </p:spPr>
+        <p:txBody>
+          <a:bodyPr>
+            <a:normAutofit/>
+          </a:bodyPr>
+          <a:lstStyle/>
+          <a:p>
+            <a:r>
+              <a:rPr lang="it-IT" sz="4000" dirty="0">
+                <a:solidFill>
+                  <a:srgbClr val="FFFFFF"/>
+                </a:solidFill>
+              </a:rPr>
+              <a:t>Angolo di piega con il giroscopio</a:t>
+            </a:r>
+          </a:p>
+        </p:txBody>
+      </p:sp>
+      <mc:AlternateContent xmlns:mc="http://schemas.openxmlformats.org/markup-compatibility/2006">
+        <mc:Choice xmlns:a14="http://schemas.microsoft.com/office/drawing/2010/main" Requires="a14">
+          <p:sp>
+            <p:nvSpPr>
+              <p:cNvPr id="3" name="Segnaposto contenuto 2">
+                <a:extLst>
+                  <a:ext uri="{FF2B5EF4-FFF2-40B4-BE49-F238E27FC236}">
+                    <a16:creationId xmlns:a16="http://schemas.microsoft.com/office/drawing/2014/main" id="{828C793B-95AE-2174-2558-5DD6691A6D15}"/>
+                  </a:ext>
+                </a:extLst>
+              </p:cNvPr>
+              <p:cNvSpPr>
+                <a:spLocks noGrp="1"/>
+              </p:cNvSpPr>
+              <p:nvPr>
+                <p:ph idx="1"/>
+              </p:nvPr>
+            </p:nvSpPr>
+            <p:spPr>
+              <a:xfrm>
+                <a:off x="1031845" y="1891970"/>
+                <a:ext cx="10235705" cy="4109585"/>
+              </a:xfrm>
+            </p:spPr>
+            <p:txBody>
+              <a:bodyPr anchor="ctr">
+                <a:normAutofit/>
+              </a:bodyPr>
+              <a:lstStyle/>
+              <a:p>
+                <a:r>
+                  <a:rPr lang="it-IT" dirty="0"/>
+                  <a:t>Il giroscopio fornisce i dati dell’accelerazione angolare relativi ai tre assi. Otteniamo l’angolo di piega integrando i valori relativi all’asse di rotazione:</a:t>
+                </a:r>
+                <a14:m>
+                  <m:oMath xmlns:m="http://schemas.openxmlformats.org/officeDocument/2006/math">
+                    <m:r>
+                      <a:rPr lang="it-IT" b="0" i="0" smtClean="0">
+                        <a:latin typeface="Cambria Math" panose="02040503050406030204" pitchFamily="18" charset="0"/>
+                        <a:ea typeface="Cambria Math" panose="02040503050406030204" pitchFamily="18" charset="0"/>
+                      </a:rPr>
+                      <m:t>  </m:t>
+                    </m:r>
+                    <m:r>
+                      <a:rPr lang="it-IT" i="1" smtClean="0">
+                        <a:latin typeface="Cambria Math" panose="02040503050406030204" pitchFamily="18" charset="0"/>
+                        <a:ea typeface="Cambria Math" panose="02040503050406030204" pitchFamily="18" charset="0"/>
+                      </a:rPr>
+                      <m:t>𝜃</m:t>
+                    </m:r>
+                    <m:r>
+                      <a:rPr lang="it-IT" b="0" i="1" smtClean="0">
+                        <a:latin typeface="Cambria Math" panose="02040503050406030204" pitchFamily="18" charset="0"/>
+                        <a:ea typeface="Cambria Math" panose="02040503050406030204" pitchFamily="18" charset="0"/>
+                      </a:rPr>
+                      <m:t>(</m:t>
+                    </m:r>
+                    <m:r>
+                      <a:rPr lang="it-IT" b="0" i="1" smtClean="0">
+                        <a:latin typeface="Cambria Math" panose="02040503050406030204" pitchFamily="18" charset="0"/>
+                        <a:ea typeface="Cambria Math" panose="02040503050406030204" pitchFamily="18" charset="0"/>
+                      </a:rPr>
+                      <m:t>𝑡</m:t>
+                    </m:r>
+                    <m:r>
+                      <a:rPr lang="it-IT" b="0" i="1" smtClean="0">
+                        <a:latin typeface="Cambria Math" panose="02040503050406030204" pitchFamily="18" charset="0"/>
+                        <a:ea typeface="Cambria Math" panose="02040503050406030204" pitchFamily="18" charset="0"/>
+                      </a:rPr>
+                      <m:t>)=</m:t>
+                    </m:r>
+                    <m:nary>
+                      <m:naryPr>
+                        <m:limLoc m:val="undOvr"/>
+                        <m:subHide m:val="on"/>
+                        <m:supHide m:val="on"/>
+                        <m:ctrlPr>
+                          <a:rPr lang="it-IT" b="0" i="1" smtClean="0">
+                            <a:latin typeface="Cambria Math" panose="02040503050406030204" pitchFamily="18" charset="0"/>
+                            <a:ea typeface="Cambria Math" panose="02040503050406030204" pitchFamily="18" charset="0"/>
+                          </a:rPr>
+                        </m:ctrlPr>
+                      </m:naryPr>
+                      <m:sub/>
+                      <m:sup/>
+                      <m:e>
+                        <m:r>
+                          <a:rPr lang="it-IT" b="0" i="1" smtClean="0">
+                            <a:latin typeface="Cambria Math" panose="02040503050406030204" pitchFamily="18" charset="0"/>
+                            <a:ea typeface="Cambria Math" panose="02040503050406030204" pitchFamily="18" charset="0"/>
+                          </a:rPr>
+                          <m:t>𝜔</m:t>
+                        </m:r>
+                        <m:r>
+                          <a:rPr lang="it-IT" b="0" i="1" smtClean="0">
+                            <a:latin typeface="Cambria Math" panose="02040503050406030204" pitchFamily="18" charset="0"/>
+                            <a:ea typeface="Cambria Math" panose="02040503050406030204" pitchFamily="18" charset="0"/>
+                          </a:rPr>
+                          <m:t>𝑑𝑡</m:t>
+                        </m:r>
+                      </m:e>
+                    </m:nary>
+                  </m:oMath>
+                </a14:m>
+                <a:endParaRPr lang="it-IT" dirty="0"/>
+              </a:p>
+              <a:p>
+                <a:r>
+                  <a:rPr lang="it-IT" dirty="0"/>
+                  <a:t>A livello pratico questo equivale a sommare il valore del giroscopio moltiplicando ogni valore per la differenza di tempo rispetto al valore precedente:</a:t>
+                </a:r>
+                <a14:m>
+                  <m:oMath xmlns:m="http://schemas.openxmlformats.org/officeDocument/2006/math">
+                    <m:r>
+                      <a:rPr lang="it-IT" b="0" i="0" smtClean="0">
+                        <a:latin typeface="Cambria Math" panose="02040503050406030204" pitchFamily="18" charset="0"/>
+                        <a:ea typeface="Cambria Math" panose="02040503050406030204" pitchFamily="18" charset="0"/>
+                      </a:rPr>
+                      <m:t>  </m:t>
+                    </m:r>
+                    <m:r>
+                      <a:rPr lang="it-IT" i="1">
+                        <a:latin typeface="Cambria Math" panose="02040503050406030204" pitchFamily="18" charset="0"/>
+                        <a:ea typeface="Cambria Math" panose="02040503050406030204" pitchFamily="18" charset="0"/>
+                      </a:rPr>
+                      <m:t>𝜃</m:t>
+                    </m:r>
+                    <m:d>
+                      <m:dPr>
+                        <m:ctrlPr>
+                          <a:rPr lang="it-IT" i="1">
+                            <a:latin typeface="Cambria Math" panose="02040503050406030204" pitchFamily="18" charset="0"/>
+                            <a:ea typeface="Cambria Math" panose="02040503050406030204" pitchFamily="18" charset="0"/>
+                          </a:rPr>
+                        </m:ctrlPr>
+                      </m:dPr>
+                      <m:e>
+                        <m:r>
+                          <a:rPr lang="it-IT" b="0" i="1" smtClean="0">
+                            <a:latin typeface="Cambria Math" panose="02040503050406030204" pitchFamily="18" charset="0"/>
+                            <a:ea typeface="Cambria Math" panose="02040503050406030204" pitchFamily="18" charset="0"/>
+                          </a:rPr>
+                          <m:t>𝑛</m:t>
+                        </m:r>
+                      </m:e>
+                    </m:d>
+                    <m:r>
+                      <a:rPr lang="it-IT" i="1">
+                        <a:latin typeface="Cambria Math" panose="02040503050406030204" pitchFamily="18" charset="0"/>
+                        <a:ea typeface="Cambria Math" panose="02040503050406030204" pitchFamily="18" charset="0"/>
+                      </a:rPr>
+                      <m:t>=</m:t>
+                    </m:r>
+                    <m:r>
+                      <a:rPr lang="it-IT" i="1">
+                        <a:latin typeface="Cambria Math" panose="02040503050406030204" pitchFamily="18" charset="0"/>
+                        <a:ea typeface="Cambria Math" panose="02040503050406030204" pitchFamily="18" charset="0"/>
+                      </a:rPr>
+                      <m:t>𝜃</m:t>
+                    </m:r>
+                    <m:d>
+                      <m:dPr>
+                        <m:ctrlPr>
+                          <a:rPr lang="it-IT" i="1">
+                            <a:latin typeface="Cambria Math" panose="02040503050406030204" pitchFamily="18" charset="0"/>
+                            <a:ea typeface="Cambria Math" panose="02040503050406030204" pitchFamily="18" charset="0"/>
+                          </a:rPr>
+                        </m:ctrlPr>
+                      </m:dPr>
+                      <m:e>
+                        <m:r>
+                          <a:rPr lang="it-IT" i="1">
+                            <a:latin typeface="Cambria Math" panose="02040503050406030204" pitchFamily="18" charset="0"/>
+                            <a:ea typeface="Cambria Math" panose="02040503050406030204" pitchFamily="18" charset="0"/>
+                          </a:rPr>
+                          <m:t>𝑛</m:t>
+                        </m:r>
+                        <m:r>
+                          <a:rPr lang="it-IT" b="0" i="1" smtClean="0">
+                            <a:latin typeface="Cambria Math" panose="02040503050406030204" pitchFamily="18" charset="0"/>
+                            <a:ea typeface="Cambria Math" panose="02040503050406030204" pitchFamily="18" charset="0"/>
+                          </a:rPr>
+                          <m:t>−1</m:t>
+                        </m:r>
+                      </m:e>
+                    </m:d>
+                    <m:r>
+                      <a:rPr lang="it-IT" b="0" i="1" smtClean="0">
+                        <a:latin typeface="Cambria Math" panose="02040503050406030204" pitchFamily="18" charset="0"/>
+                        <a:ea typeface="Cambria Math" panose="02040503050406030204" pitchFamily="18" charset="0"/>
+                      </a:rPr>
+                      <m:t>+</m:t>
+                    </m:r>
+                    <m:r>
+                      <a:rPr lang="it-IT" b="0" i="1" smtClean="0">
+                        <a:latin typeface="Cambria Math" panose="02040503050406030204" pitchFamily="18" charset="0"/>
+                        <a:ea typeface="Cambria Math" panose="02040503050406030204" pitchFamily="18" charset="0"/>
+                      </a:rPr>
+                      <m:t>𝜔</m:t>
+                    </m:r>
+                    <m:d>
+                      <m:dPr>
+                        <m:ctrlPr>
+                          <a:rPr lang="it-IT" b="0" i="1" smtClean="0">
+                            <a:latin typeface="Cambria Math" panose="02040503050406030204" pitchFamily="18" charset="0"/>
+                            <a:ea typeface="Cambria Math" panose="02040503050406030204" pitchFamily="18" charset="0"/>
+                          </a:rPr>
+                        </m:ctrlPr>
+                      </m:dPr>
+                      <m:e>
+                        <m:r>
+                          <a:rPr lang="it-IT" b="0" i="1" smtClean="0">
+                            <a:latin typeface="Cambria Math" panose="02040503050406030204" pitchFamily="18" charset="0"/>
+                            <a:ea typeface="Cambria Math" panose="02040503050406030204" pitchFamily="18" charset="0"/>
+                          </a:rPr>
+                          <m:t>𝑛</m:t>
+                        </m:r>
+                      </m:e>
+                    </m:d>
+                    <m:r>
+                      <a:rPr lang="it-IT" b="0" i="1" smtClean="0">
+                        <a:latin typeface="Cambria Math" panose="02040503050406030204" pitchFamily="18" charset="0"/>
+                        <a:ea typeface="Cambria Math" panose="02040503050406030204" pitchFamily="18" charset="0"/>
+                      </a:rPr>
+                      <m:t>∗∆</m:t>
+                    </m:r>
+                    <m:r>
+                      <a:rPr lang="it-IT" b="0" i="1" smtClean="0">
+                        <a:latin typeface="Cambria Math" panose="02040503050406030204" pitchFamily="18" charset="0"/>
+                        <a:ea typeface="Cambria Math" panose="02040503050406030204" pitchFamily="18" charset="0"/>
+                      </a:rPr>
+                      <m:t>𝑡</m:t>
+                    </m:r>
+                    <m:r>
+                      <a:rPr lang="it-IT" b="0" i="1" smtClean="0">
+                        <a:latin typeface="Cambria Math" panose="02040503050406030204" pitchFamily="18" charset="0"/>
+                        <a:ea typeface="Cambria Math" panose="02040503050406030204" pitchFamily="18" charset="0"/>
+                      </a:rPr>
+                      <m:t>(</m:t>
+                    </m:r>
+                    <m:r>
+                      <a:rPr lang="it-IT" b="0" i="1" smtClean="0">
+                        <a:latin typeface="Cambria Math" panose="02040503050406030204" pitchFamily="18" charset="0"/>
+                        <a:ea typeface="Cambria Math" panose="02040503050406030204" pitchFamily="18" charset="0"/>
+                      </a:rPr>
+                      <m:t>𝑛</m:t>
+                    </m:r>
+                    <m:r>
+                      <a:rPr lang="it-IT" b="0" i="1" smtClean="0">
+                        <a:latin typeface="Cambria Math" panose="02040503050406030204" pitchFamily="18" charset="0"/>
+                        <a:ea typeface="Cambria Math" panose="02040503050406030204" pitchFamily="18" charset="0"/>
+                      </a:rPr>
+                      <m:t>)</m:t>
+                    </m:r>
+                  </m:oMath>
+                </a14:m>
+                <a:endParaRPr lang="it-IT" dirty="0"/>
+              </a:p>
+              <a:p>
+                <a:r>
+                  <a:rPr lang="it-IT" dirty="0"/>
+                  <a:t>A causa della natura del giroscopio, tuttavia, il calcolo dell’angolo tende a divergere dalla reale misura, con il passare del tempo, in maniera troppo evidente.</a:t>
+                </a:r>
+              </a:p>
+            </p:txBody>
+          </p:sp>
+        </mc:Choice>
+        <mc:Fallback>
+          <p:sp>
+            <p:nvSpPr>
+              <p:cNvPr id="3" name="Segnaposto contenuto 2">
+                <a:extLst>
+                  <a:ext uri="{FF2B5EF4-FFF2-40B4-BE49-F238E27FC236}">
+                    <a16:creationId xmlns:a16="http://schemas.microsoft.com/office/drawing/2014/main" id="{828C793B-95AE-2174-2558-5DD6691A6D15}"/>
+                  </a:ext>
+                </a:extLst>
+              </p:cNvPr>
+              <p:cNvSpPr>
+                <a:spLocks noGrp="1" noRot="1" noChangeAspect="1" noMove="1" noResize="1" noEditPoints="1" noAdjustHandles="1" noChangeArrowheads="1" noChangeShapeType="1" noTextEdit="1"/>
+              </p:cNvSpPr>
+              <p:nvPr>
+                <p:ph idx="1"/>
+              </p:nvPr>
+            </p:nvSpPr>
+            <p:spPr>
+              <a:xfrm>
+                <a:off x="1031845" y="1891970"/>
+                <a:ext cx="10235705" cy="4109585"/>
+              </a:xfrm>
+              <a:blipFill>
+                <a:blip r:embed="rId2"/>
+                <a:stretch>
+                  <a:fillRect l="-1072" r="-60" b="-1185"/>
+                </a:stretch>
+              </a:blipFill>
+            </p:spPr>
+            <p:txBody>
+              <a:bodyPr/>
+              <a:lstStyle/>
+              <a:p>
+                <a:r>
+                  <a:rPr lang="it-IT">
+                    <a:noFill/>
+                  </a:rPr>
+                  <a:t> </a:t>
+                </a:r>
+              </a:p>
+            </p:txBody>
+          </p:sp>
+        </mc:Fallback>
+      </mc:AlternateContent>
+      <mc:AlternateContent xmlns:mc="http://schemas.openxmlformats.org/markup-compatibility/2006">
+        <mc:Choice xmlns:a14="http://schemas.microsoft.com/office/drawing/2010/main" Requires="a14">
+          <p:sp>
+            <p:nvSpPr>
+              <p:cNvPr id="4" name="CasellaDiTesto 3">
+                <a:extLst>
+                  <a:ext uri="{FF2B5EF4-FFF2-40B4-BE49-F238E27FC236}">
+                    <a16:creationId xmlns:a16="http://schemas.microsoft.com/office/drawing/2014/main" id="{154D0715-8ED1-E508-66CE-907C6C0F09DB}"/>
+                  </a:ext>
+                </a:extLst>
+              </p:cNvPr>
+              <p:cNvSpPr txBox="1"/>
+              <p:nvPr/>
+            </p:nvSpPr>
+            <p:spPr>
+              <a:xfrm>
+                <a:off x="7710618" y="5771626"/>
+                <a:ext cx="3556932" cy="923330"/>
+              </a:xfrm>
+              <a:prstGeom prst="rect">
+                <a:avLst/>
+              </a:prstGeom>
+              <a:noFill/>
+            </p:spPr>
+            <p:txBody>
+              <a:bodyPr wrap="square" rtlCol="0">
+                <a:spAutoFit/>
+              </a:bodyPr>
+              <a:lstStyle/>
+              <a:p>
+                <a:r>
+                  <a:rPr lang="it-IT" dirty="0"/>
+                  <a:t>NOTA: </a:t>
+                </a:r>
+                <a14:m>
+                  <m:oMath xmlns:m="http://schemas.openxmlformats.org/officeDocument/2006/math">
+                    <m:r>
+                      <a:rPr lang="it-IT" b="0" i="1" smtClean="0">
+                        <a:latin typeface="Cambria Math" panose="02040503050406030204" pitchFamily="18" charset="0"/>
+                        <a:ea typeface="Cambria Math" panose="02040503050406030204" pitchFamily="18" charset="0"/>
+                      </a:rPr>
+                      <m:t>∆</m:t>
+                    </m:r>
+                    <m:r>
+                      <a:rPr lang="it-IT" b="0" i="1" smtClean="0">
+                        <a:latin typeface="Cambria Math" panose="02040503050406030204" pitchFamily="18" charset="0"/>
+                        <a:ea typeface="Cambria Math" panose="02040503050406030204" pitchFamily="18" charset="0"/>
+                      </a:rPr>
+                      <m:t>𝑡</m:t>
+                    </m:r>
+                    <m:d>
+                      <m:dPr>
+                        <m:ctrlPr>
+                          <a:rPr lang="it-IT" b="0" i="1" smtClean="0">
+                            <a:latin typeface="Cambria Math" panose="02040503050406030204" pitchFamily="18" charset="0"/>
+                            <a:ea typeface="Cambria Math" panose="02040503050406030204" pitchFamily="18" charset="0"/>
+                          </a:rPr>
+                        </m:ctrlPr>
+                      </m:dPr>
+                      <m:e>
+                        <m:r>
+                          <a:rPr lang="it-IT" b="0" i="1" smtClean="0">
+                            <a:latin typeface="Cambria Math" panose="02040503050406030204" pitchFamily="18" charset="0"/>
+                            <a:ea typeface="Cambria Math" panose="02040503050406030204" pitchFamily="18" charset="0"/>
+                          </a:rPr>
+                          <m:t>𝑛</m:t>
+                        </m:r>
+                      </m:e>
+                    </m:d>
+                  </m:oMath>
+                </a14:m>
+                <a:r>
+                  <a:rPr lang="it-IT" dirty="0"/>
+                  <a:t> poiché non è fisso ma varia a seconda dei campioni</a:t>
+                </a:r>
+              </a:p>
+              <a:p>
+                <a:r>
+                  <a:rPr lang="it-IT" dirty="0"/>
+                  <a:t> </a:t>
+                </a:r>
+              </a:p>
+            </p:txBody>
+          </p:sp>
+        </mc:Choice>
+        <mc:Fallback>
+          <p:sp>
+            <p:nvSpPr>
+              <p:cNvPr id="4" name="CasellaDiTesto 3">
+                <a:extLst>
+                  <a:ext uri="{FF2B5EF4-FFF2-40B4-BE49-F238E27FC236}">
+                    <a16:creationId xmlns:a16="http://schemas.microsoft.com/office/drawing/2014/main" id="{154D0715-8ED1-E508-66CE-907C6C0F09DB}"/>
+                  </a:ext>
+                </a:extLst>
+              </p:cNvPr>
+              <p:cNvSpPr txBox="1">
+                <a:spLocks noRot="1" noChangeAspect="1" noMove="1" noResize="1" noEditPoints="1" noAdjustHandles="1" noChangeArrowheads="1" noChangeShapeType="1" noTextEdit="1"/>
+              </p:cNvSpPr>
+              <p:nvPr/>
+            </p:nvSpPr>
+            <p:spPr>
+              <a:xfrm>
+                <a:off x="7710618" y="5771626"/>
+                <a:ext cx="3556932" cy="923330"/>
+              </a:xfrm>
+              <a:prstGeom prst="rect">
+                <a:avLst/>
+              </a:prstGeom>
+              <a:blipFill>
+                <a:blip r:embed="rId3"/>
+                <a:stretch>
+                  <a:fillRect l="-1544" t="-3974"/>
+                </a:stretch>
+              </a:blipFill>
+            </p:spPr>
+            <p:txBody>
+              <a:bodyPr/>
+              <a:lstStyle/>
+              <a:p>
+                <a:r>
+                  <a:rPr lang="it-IT">
+                    <a:noFill/>
+                  </a:rPr>
+                  <a:t> </a:t>
+                </a:r>
+              </a:p>
+            </p:txBody>
+          </p:sp>
+        </mc:Fallback>
+      </mc:AlternateContent>
+    </p:spTree>
+    <p:extLst>
+      <p:ext uri="{BB962C8B-B14F-4D97-AF65-F5344CB8AC3E}">
+        <p14:creationId xmlns:p14="http://schemas.microsoft.com/office/powerpoint/2010/main" val="1011851456"/>
+      </p:ext>
+    </p:extLst>
+  </p:cSld>
+  <p:clrMapOvr>
+    <a:masterClrMapping/>
+  </p:clrMapOvr>
+</p:sld>
+</file>
+
+<file path=ppt/slides/slide7.xml><?xml version="1.0" encoding="utf-8"?>
+<p:sld xmlns:a="http://schemas.openxmlformats.org/drawingml/2006/main" xmlns:r="http://schemas.openxmlformats.org/officeDocument/2006/relationships" xmlns:p="http://schemas.openxmlformats.org/presentationml/2006/main">
+  <p:cSld>
+    <p:bg>
+      <p:bgPr>
+        <a:solidFill>
+          <a:schemeClr val="bg1"/>
+        </a:solidFill>
+        <a:effectLst/>
+      </p:bgPr>
+    </p:bg>
+    <p:spTree>
+      <p:nvGrpSpPr>
+        <p:cNvPr id="1" name=""/>
+        <p:cNvGrpSpPr/>
+        <p:nvPr/>
+      </p:nvGrpSpPr>
+      <p:grpSpPr>
+        <a:xfrm>
+          <a:off x="0" y="0"/>
+          <a:ext cx="0" cy="0"/>
+          <a:chOff x="0" y="0"/>
+          <a:chExt cx="0" cy="0"/>
+        </a:xfrm>
+      </p:grpSpPr>
+      <p:sp useBgFill="1">
+        <p:nvSpPr>
+          <p:cNvPr id="8" name="Rectangle 7">
+            <a:extLst>
+              <a:ext uri="{FF2B5EF4-FFF2-40B4-BE49-F238E27FC236}">
+                <a16:creationId xmlns:a16="http://schemas.microsoft.com/office/drawing/2014/main" id="{1B15ED52-F352-441B-82BF-E0EA34836D08}"/>
+              </a:ext>
+              <a:ext uri="{C183D7F6-B498-43B3-948B-1728B52AA6E4}">
+                <adec:decorative xmlns:adec="http://schemas.microsoft.com/office/drawing/2017/decorative" val="1"/>
+              </a:ext>
+            </a:extLst>
+          </p:cNvPr>
+          <p:cNvSpPr>
+            <a:spLocks noGrp="1" noRot="1" noChangeAspect="1" noMove="1" noResize="1" noEditPoints="1" noAdjustHandles="1" noChangeArrowheads="1" noChangeShapeType="1" noTextEdit="1"/>
+          </p:cNvSpPr>
+          <p:nvPr>
+            <p:extLst>
+              <p:ext uri="{386F3935-93C4-4BCD-93E2-E3B085C9AB24}">
+                <p16:designElem xmlns:p16="http://schemas.microsoft.com/office/powerpoint/2015/main" val="1"/>
+              </p:ext>
+            </p:extLst>
+          </p:nvPr>
+        </p:nvSpPr>
+        <p:spPr>
+          <a:xfrm>
+            <a:off x="0" y="0"/>
+            <a:ext cx="12192000" cy="6858000"/>
+          </a:xfrm>
+          <a:prstGeom prst="rect">
+            <a:avLst/>
+          </a:prstGeom>
+          <a:ln w="12700" cap="flat" cmpd="sng" algn="ctr">
+            <a:noFill/>
+            <a:prstDash val="solid"/>
+            <a:miter lim="800000"/>
+          </a:ln>
+          <a:effectLst/>
+          <a:extLst>
+            <a:ext uri="{91240B29-F687-4F45-9708-019B960494DF}">
+              <a14:hiddenLine xmlns:a14="http://schemas.microsoft.com/office/drawing/2010/main" w="12700" cap="flat" cmpd="sng" algn="ctr">
+                <a:solidFill>
+                  <a:schemeClr val="accent1">
+                    <a:shade val="50000"/>
+                  </a:schemeClr>
+                </a:solidFill>
+                <a:prstDash val="solid"/>
+                <a:miter lim="800000"/>
+              </a14:hiddenLine>
+            </a:ext>
+          </a:extLst>
+        </p:spPr>
+        <p:style>
+          <a:lnRef idx="2">
+            <a:schemeClr val="accent1">
+              <a:shade val="50000"/>
+            </a:schemeClr>
+          </a:lnRef>
+          <a:fillRef idx="1">
+            <a:schemeClr val="accent1"/>
+          </a:fillRef>
+          <a:effectRef idx="0">
+            <a:schemeClr val="accent1"/>
+          </a:effectRef>
+          <a:fontRef idx="minor">
+            <a:schemeClr val="lt1"/>
+          </a:fontRef>
+        </p:style>
+        <p:txBody>
+          <a:bodyPr rtlCol="0" anchor="ctr"/>
+          <a:lstStyle/>
+          <a:p>
+            <a:pPr algn="ctr"/>
+            <a:endParaRPr lang="en-US"/>
+          </a:p>
+        </p:txBody>
+      </p:sp>
+      <p:sp>
+        <p:nvSpPr>
+          <p:cNvPr id="10" name="Rectangle 9">
+            <a:extLst>
+              <a:ext uri="{FF2B5EF4-FFF2-40B4-BE49-F238E27FC236}">
+                <a16:creationId xmlns:a16="http://schemas.microsoft.com/office/drawing/2014/main" id="{3B2E3793-BFE6-45A2-9B7B-E18844431C99}"/>
+              </a:ext>
+              <a:ext uri="{C183D7F6-B498-43B3-948B-1728B52AA6E4}">
+                <adec:decorative xmlns:adec="http://schemas.microsoft.com/office/drawing/2017/decorative" val="1"/>
+              </a:ext>
+            </a:extLst>
+          </p:cNvPr>
+          <p:cNvSpPr>
+            <a:spLocks noGrp="1" noRot="1" noChangeAspect="1" noMove="1" noResize="1" noEditPoints="1" noAdjustHandles="1" noChangeArrowheads="1" noChangeShapeType="1" noTextEdit="1"/>
+          </p:cNvSpPr>
+          <p:nvPr>
+            <p:extLst>
+              <p:ext uri="{386F3935-93C4-4BCD-93E2-E3B085C9AB24}">
+                <p16:designElem xmlns:p16="http://schemas.microsoft.com/office/powerpoint/2015/main" val="1"/>
+              </p:ext>
+            </p:extLst>
+          </p:nvPr>
+        </p:nvSpPr>
+        <p:spPr>
+          <a:xfrm flipH="1">
+            <a:off x="-1" y="-1"/>
+            <a:ext cx="12191998" cy="1590742"/>
+          </a:xfrm>
+          <a:prstGeom prst="rect">
+            <a:avLst/>
+          </a:prstGeom>
+          <a:gradFill>
+            <a:gsLst>
+              <a:gs pos="0">
+                <a:srgbClr val="000000"/>
+              </a:gs>
+              <a:gs pos="100000">
+                <a:schemeClr val="accent1">
+                  <a:lumMod val="75000"/>
+                </a:schemeClr>
+              </a:gs>
+            </a:gsLst>
+            <a:lin ang="8400000" scaled="0"/>
+          </a:gradFill>
+          <a:ln>
+            <a:noFill/>
+          </a:ln>
+        </p:spPr>
+        <p:style>
+          <a:lnRef idx="2">
+            <a:schemeClr val="accent1">
+              <a:shade val="50000"/>
+            </a:schemeClr>
+          </a:lnRef>
+          <a:fillRef idx="1">
+            <a:schemeClr val="accent1"/>
+          </a:fillRef>
+          <a:effectRef idx="0">
+            <a:schemeClr val="accent1"/>
+          </a:effectRef>
+          <a:fontRef idx="minor">
+            <a:schemeClr val="lt1"/>
+          </a:fontRef>
+        </p:style>
+        <p:txBody>
+          <a:bodyPr rtlCol="0" anchor="ctr"/>
+          <a:lstStyle/>
+          <a:p>
+            <a:pPr algn="ctr"/>
+            <a:endParaRPr lang="en-US"/>
+          </a:p>
+        </p:txBody>
+      </p:sp>
+      <p:sp>
+        <p:nvSpPr>
+          <p:cNvPr id="12" name="Rectangle 11">
+            <a:extLst>
+              <a:ext uri="{FF2B5EF4-FFF2-40B4-BE49-F238E27FC236}">
+                <a16:creationId xmlns:a16="http://schemas.microsoft.com/office/drawing/2014/main" id="{BC4C4868-CB8F-4AF9-9CDB-8108F2C19B67}"/>
+              </a:ext>
+              <a:ext uri="{C183D7F6-B498-43B3-948B-1728B52AA6E4}">
+                <adec:decorative xmlns:adec="http://schemas.microsoft.com/office/drawing/2017/decorative" val="1"/>
+              </a:ext>
+            </a:extLst>
+          </p:cNvPr>
+          <p:cNvSpPr>
+            <a:spLocks noGrp="1" noRot="1" noChangeAspect="1" noMove="1" noResize="1" noEditPoints="1" noAdjustHandles="1" noChangeArrowheads="1" noChangeShapeType="1" noTextEdit="1"/>
+          </p:cNvSpPr>
+          <p:nvPr>
+            <p:extLst>
+              <p:ext uri="{386F3935-93C4-4BCD-93E2-E3B085C9AB24}">
+                <p16:designElem xmlns:p16="http://schemas.microsoft.com/office/powerpoint/2015/main" val="1"/>
+              </p:ext>
+            </p:extLst>
+          </p:nvPr>
+        </p:nvSpPr>
+        <p:spPr>
+          <a:xfrm rot="10800000" flipH="1">
+            <a:off x="-3" y="0"/>
+            <a:ext cx="8115306" cy="1590742"/>
+          </a:xfrm>
+          <a:prstGeom prst="rect">
+            <a:avLst/>
+          </a:prstGeom>
+          <a:gradFill>
+            <a:gsLst>
+              <a:gs pos="20000">
+                <a:schemeClr val="accent1">
+                  <a:alpha val="0"/>
+                </a:schemeClr>
+              </a:gs>
+              <a:gs pos="100000">
+                <a:schemeClr val="accent1">
+                  <a:lumMod val="50000"/>
+                  <a:alpha val="55000"/>
+                </a:schemeClr>
+              </a:gs>
+            </a:gsLst>
+            <a:lin ang="13800000" scaled="0"/>
+          </a:gradFill>
+          <a:ln>
+            <a:noFill/>
+          </a:ln>
+        </p:spPr>
+        <p:style>
+          <a:lnRef idx="2">
+            <a:schemeClr val="accent1">
+              <a:shade val="50000"/>
+            </a:schemeClr>
+          </a:lnRef>
+          <a:fillRef idx="1">
+            <a:schemeClr val="accent1"/>
+          </a:fillRef>
+          <a:effectRef idx="0">
+            <a:schemeClr val="accent1"/>
+          </a:effectRef>
+          <a:fontRef idx="minor">
+            <a:schemeClr val="lt1"/>
+          </a:fontRef>
+        </p:style>
+        <p:txBody>
+          <a:bodyPr rtlCol="0" anchor="ctr"/>
+          <a:lstStyle/>
+          <a:p>
+            <a:pPr algn="ctr"/>
+            <a:endParaRPr lang="en-US"/>
+          </a:p>
+        </p:txBody>
+      </p:sp>
+      <p:sp>
+        <p:nvSpPr>
+          <p:cNvPr id="14" name="Rectangle 13">
+            <a:extLst>
+              <a:ext uri="{FF2B5EF4-FFF2-40B4-BE49-F238E27FC236}">
+                <a16:creationId xmlns:a16="http://schemas.microsoft.com/office/drawing/2014/main" id="{375E0459-6403-40CD-989D-56A4407CA12E}"/>
+              </a:ext>
+              <a:ext uri="{C183D7F6-B498-43B3-948B-1728B52AA6E4}">
+                <adec:decorative xmlns:adec="http://schemas.microsoft.com/office/drawing/2017/decorative" val="1"/>
+              </a:ext>
+            </a:extLst>
+          </p:cNvPr>
+          <p:cNvSpPr>
+            <a:spLocks noGrp="1" noRot="1" noChangeAspect="1" noMove="1" noResize="1" noEditPoints="1" noAdjustHandles="1" noChangeArrowheads="1" noChangeShapeType="1" noTextEdit="1"/>
+          </p:cNvSpPr>
+          <p:nvPr>
+            <p:extLst>
+              <p:ext uri="{386F3935-93C4-4BCD-93E2-E3B085C9AB24}">
+                <p16:designElem xmlns:p16="http://schemas.microsoft.com/office/powerpoint/2015/main" val="1"/>
+              </p:ext>
+            </p:extLst>
+          </p:nvPr>
+        </p:nvSpPr>
+        <p:spPr>
+          <a:xfrm flipH="1">
+            <a:off x="8115299" y="-1"/>
+            <a:ext cx="4076698" cy="1590742"/>
+          </a:xfrm>
+          <a:prstGeom prst="rect">
+            <a:avLst/>
+          </a:prstGeom>
+          <a:gradFill>
+            <a:gsLst>
+              <a:gs pos="0">
+                <a:schemeClr val="accent1">
+                  <a:alpha val="66000"/>
+                </a:schemeClr>
+              </a:gs>
+              <a:gs pos="100000">
+                <a:srgbClr val="000000">
+                  <a:alpha val="30000"/>
+                </a:srgbClr>
+              </a:gs>
+            </a:gsLst>
+            <a:lin ang="13200000" scaled="0"/>
+          </a:gradFill>
+          <a:ln>
+            <a:noFill/>
+          </a:ln>
+        </p:spPr>
+        <p:style>
+          <a:lnRef idx="2">
+            <a:schemeClr val="accent1">
+              <a:shade val="50000"/>
+            </a:schemeClr>
+          </a:lnRef>
+          <a:fillRef idx="1">
+            <a:schemeClr val="accent1"/>
+          </a:fillRef>
+          <a:effectRef idx="0">
+            <a:schemeClr val="accent1"/>
+          </a:effectRef>
+          <a:fontRef idx="minor">
+            <a:schemeClr val="lt1"/>
+          </a:fontRef>
+        </p:style>
+        <p:txBody>
+          <a:bodyPr rtlCol="0" anchor="ctr"/>
+          <a:lstStyle/>
+          <a:p>
+            <a:pPr algn="ctr"/>
+            <a:endParaRPr lang="en-US"/>
+          </a:p>
+        </p:txBody>
+      </p:sp>
+      <p:sp>
+        <p:nvSpPr>
+          <p:cNvPr id="16" name="Rectangle 15">
+            <a:extLst>
+              <a:ext uri="{FF2B5EF4-FFF2-40B4-BE49-F238E27FC236}">
+                <a16:creationId xmlns:a16="http://schemas.microsoft.com/office/drawing/2014/main" id="{53E5B1A8-3AC9-4BD1-9BBC-78CA94F2D1BA}"/>
+              </a:ext>
+              <a:ext uri="{C183D7F6-B498-43B3-948B-1728B52AA6E4}">
+                <adec:decorative xmlns:adec="http://schemas.microsoft.com/office/drawing/2017/decorative" val="1"/>
+              </a:ext>
+            </a:extLst>
+          </p:cNvPr>
+          <p:cNvSpPr>
+            <a:spLocks noGrp="1" noRot="1" noChangeAspect="1" noMove="1" noResize="1" noEditPoints="1" noAdjustHandles="1" noChangeArrowheads="1" noChangeShapeType="1" noTextEdit="1"/>
+          </p:cNvSpPr>
+          <p:nvPr>
+            <p:extLst>
+              <p:ext uri="{386F3935-93C4-4BCD-93E2-E3B085C9AB24}">
+                <p16:designElem xmlns:p16="http://schemas.microsoft.com/office/powerpoint/2015/main" val="1"/>
+              </p:ext>
+            </p:extLst>
+          </p:nvPr>
+        </p:nvSpPr>
+        <p:spPr>
+          <a:xfrm>
+            <a:off x="459350" y="-1"/>
+            <a:ext cx="11732646" cy="1597433"/>
+          </a:xfrm>
+          <a:prstGeom prst="rect">
+            <a:avLst/>
+          </a:prstGeom>
+          <a:gradFill>
+            <a:gsLst>
+              <a:gs pos="50000">
+                <a:srgbClr val="000000">
+                  <a:alpha val="0"/>
+                </a:srgbClr>
+              </a:gs>
+              <a:gs pos="99000">
+                <a:schemeClr val="accent1">
+                  <a:lumMod val="50000"/>
+                  <a:alpha val="52000"/>
+                </a:schemeClr>
+              </a:gs>
+            </a:gsLst>
+            <a:lin ang="16800000" scaled="0"/>
+          </a:gradFill>
+          <a:ln>
+            <a:noFill/>
+          </a:ln>
+        </p:spPr>
+        <p:style>
+          <a:lnRef idx="2">
+            <a:schemeClr val="accent1">
+              <a:shade val="50000"/>
+            </a:schemeClr>
+          </a:lnRef>
+          <a:fillRef idx="1">
+            <a:schemeClr val="accent1"/>
+          </a:fillRef>
+          <a:effectRef idx="0">
+            <a:schemeClr val="accent1"/>
+          </a:effectRef>
+          <a:fontRef idx="minor">
+            <a:schemeClr val="lt1"/>
+          </a:fontRef>
+        </p:style>
+        <p:txBody>
+          <a:bodyPr rtlCol="0" anchor="ctr"/>
+          <a:lstStyle/>
+          <a:p>
+            <a:pPr algn="ctr"/>
+            <a:endParaRPr lang="en-US"/>
+          </a:p>
+        </p:txBody>
+      </p:sp>
+      <p:sp>
+        <p:nvSpPr>
+          <p:cNvPr id="2" name="Titolo 1">
+            <a:extLst>
+              <a:ext uri="{FF2B5EF4-FFF2-40B4-BE49-F238E27FC236}">
+                <a16:creationId xmlns:a16="http://schemas.microsoft.com/office/drawing/2014/main" id="{63A158F4-458B-14A2-69AC-328498970DBE}"/>
+              </a:ext>
+            </a:extLst>
+          </p:cNvPr>
+          <p:cNvSpPr>
+            <a:spLocks noGrp="1"/>
+          </p:cNvSpPr>
+          <p:nvPr>
+            <p:ph type="title"/>
+          </p:nvPr>
+        </p:nvSpPr>
+        <p:spPr>
+          <a:xfrm>
+            <a:off x="1371599" y="294538"/>
+            <a:ext cx="9895951" cy="1033669"/>
+          </a:xfrm>
+        </p:spPr>
+        <p:txBody>
+          <a:bodyPr>
+            <a:normAutofit/>
+          </a:bodyPr>
+          <a:lstStyle/>
+          <a:p>
+            <a:r>
+              <a:rPr lang="it-IT" sz="4000" dirty="0">
+                <a:solidFill>
+                  <a:srgbClr val="FFFFFF"/>
+                </a:solidFill>
+              </a:rPr>
+              <a:t>Angolo di piega con l’accelerometro</a:t>
+            </a:r>
+          </a:p>
+        </p:txBody>
+      </p:sp>
+      <p:sp>
+        <p:nvSpPr>
+          <p:cNvPr id="3" name="Segnaposto contenuto 2">
+            <a:extLst>
+              <a:ext uri="{FF2B5EF4-FFF2-40B4-BE49-F238E27FC236}">
+                <a16:creationId xmlns:a16="http://schemas.microsoft.com/office/drawing/2014/main" id="{BD444111-E208-7720-E902-B511234AD65C}"/>
+              </a:ext>
+            </a:extLst>
+          </p:cNvPr>
+          <p:cNvSpPr>
+            <a:spLocks noGrp="1"/>
+          </p:cNvSpPr>
+          <p:nvPr>
+            <p:ph idx="1"/>
+          </p:nvPr>
+        </p:nvSpPr>
+        <p:spPr>
+          <a:xfrm>
+            <a:off x="1371600" y="2318197"/>
+            <a:ext cx="7017392" cy="3683358"/>
+          </a:xfrm>
+        </p:spPr>
+        <p:txBody>
+          <a:bodyPr anchor="ctr">
+            <a:normAutofit/>
+          </a:bodyPr>
+          <a:lstStyle/>
+          <a:p>
+            <a:r>
+              <a:rPr lang="it-IT" dirty="0"/>
+              <a:t>È possibile calcolare l’angolo di piega anche come arcotangente del valore dell’accelerazione sull’asse perpendicolare all’asse di rotazione fratto l’accelerazione sull’asse z.</a:t>
+            </a:r>
+          </a:p>
+          <a:p>
+            <a:r>
+              <a:rPr lang="it-IT" dirty="0"/>
+              <a:t>La misurazione è tuttavia inaffidabile a causa del rumore introdotto dall’accelerometro e dalla presenza di altre accelerazioni</a:t>
+            </a:r>
+          </a:p>
+        </p:txBody>
+      </p:sp>
+      <p:cxnSp>
+        <p:nvCxnSpPr>
+          <p:cNvPr id="7" name="Connettore 2 6">
+            <a:extLst>
+              <a:ext uri="{FF2B5EF4-FFF2-40B4-BE49-F238E27FC236}">
+                <a16:creationId xmlns:a16="http://schemas.microsoft.com/office/drawing/2014/main" id="{51612E76-2304-2E85-8705-76AB4053B021}"/>
+              </a:ext>
+            </a:extLst>
+          </p:cNvPr>
+          <p:cNvCxnSpPr/>
+          <p:nvPr/>
+        </p:nvCxnSpPr>
+        <p:spPr>
+          <a:xfrm flipV="1">
+            <a:off x="10081258" y="3006095"/>
+            <a:ext cx="0" cy="1473627"/>
+          </a:xfrm>
+          <a:prstGeom prst="straightConnector1">
+            <a:avLst/>
+          </a:prstGeom>
+          <a:ln>
+            <a:tailEnd type="triangle"/>
+          </a:ln>
+        </p:spPr>
+        <p:style>
+          <a:lnRef idx="1">
+            <a:schemeClr val="accent1"/>
+          </a:lnRef>
+          <a:fillRef idx="0">
+            <a:schemeClr val="accent1"/>
+          </a:fillRef>
+          <a:effectRef idx="0">
+            <a:schemeClr val="accent1"/>
+          </a:effectRef>
+          <a:fontRef idx="minor">
+            <a:schemeClr val="tx1"/>
+          </a:fontRef>
+        </p:style>
+      </p:cxnSp>
+      <p:cxnSp>
+        <p:nvCxnSpPr>
+          <p:cNvPr id="13" name="Connettore 2 12">
+            <a:extLst>
+              <a:ext uri="{FF2B5EF4-FFF2-40B4-BE49-F238E27FC236}">
+                <a16:creationId xmlns:a16="http://schemas.microsoft.com/office/drawing/2014/main" id="{6BA4FD96-16D3-A648-91AD-A04279BB571E}"/>
+              </a:ext>
+            </a:extLst>
+          </p:cNvPr>
+          <p:cNvCxnSpPr>
+            <a:cxnSpLocks/>
+          </p:cNvCxnSpPr>
+          <p:nvPr/>
+        </p:nvCxnSpPr>
+        <p:spPr>
+          <a:xfrm>
+            <a:off x="10081258" y="4479722"/>
+            <a:ext cx="1510018" cy="0"/>
+          </a:xfrm>
+          <a:prstGeom prst="straightConnector1">
+            <a:avLst/>
+          </a:prstGeom>
+          <a:ln>
+            <a:tailEnd type="triangle"/>
+          </a:ln>
+        </p:spPr>
+        <p:style>
+          <a:lnRef idx="1">
+            <a:schemeClr val="accent1"/>
+          </a:lnRef>
+          <a:fillRef idx="0">
+            <a:schemeClr val="accent1"/>
+          </a:fillRef>
+          <a:effectRef idx="0">
+            <a:schemeClr val="accent1"/>
+          </a:effectRef>
+          <a:fontRef idx="minor">
+            <a:schemeClr val="tx1"/>
+          </a:fontRef>
+        </p:style>
+      </p:cxnSp>
+      <p:sp>
+        <p:nvSpPr>
+          <p:cNvPr id="15" name="CasellaDiTesto 14">
+            <a:extLst>
+              <a:ext uri="{FF2B5EF4-FFF2-40B4-BE49-F238E27FC236}">
+                <a16:creationId xmlns:a16="http://schemas.microsoft.com/office/drawing/2014/main" id="{DE34FB4A-C51E-E895-F2C6-20748EE8DB6E}"/>
+              </a:ext>
+            </a:extLst>
+          </p:cNvPr>
+          <p:cNvSpPr txBox="1"/>
+          <p:nvPr/>
+        </p:nvSpPr>
+        <p:spPr>
+          <a:xfrm>
+            <a:off x="9823506" y="2821429"/>
+            <a:ext cx="45719" cy="369332"/>
+          </a:xfrm>
+          <a:prstGeom prst="rect">
+            <a:avLst/>
+          </a:prstGeom>
+          <a:noFill/>
+        </p:spPr>
+        <p:txBody>
+          <a:bodyPr wrap="square" rtlCol="0">
+            <a:spAutoFit/>
+          </a:bodyPr>
+          <a:lstStyle/>
+          <a:p>
+            <a:r>
+              <a:rPr lang="it-IT" dirty="0"/>
+              <a:t>Z</a:t>
+            </a:r>
+          </a:p>
+        </p:txBody>
+      </p:sp>
+      <p:sp>
+        <p:nvSpPr>
+          <p:cNvPr id="17" name="CasellaDiTesto 16">
+            <a:extLst>
+              <a:ext uri="{FF2B5EF4-FFF2-40B4-BE49-F238E27FC236}">
+                <a16:creationId xmlns:a16="http://schemas.microsoft.com/office/drawing/2014/main" id="{23F3518B-9A5A-F8E8-33D5-BCDE4574DF94}"/>
+              </a:ext>
+            </a:extLst>
+          </p:cNvPr>
+          <p:cNvSpPr txBox="1"/>
+          <p:nvPr/>
+        </p:nvSpPr>
+        <p:spPr>
+          <a:xfrm>
+            <a:off x="11591276" y="4478442"/>
+            <a:ext cx="201335" cy="369332"/>
+          </a:xfrm>
+          <a:prstGeom prst="rect">
+            <a:avLst/>
+          </a:prstGeom>
+          <a:noFill/>
+        </p:spPr>
+        <p:txBody>
+          <a:bodyPr wrap="square" rtlCol="0">
+            <a:spAutoFit/>
+          </a:bodyPr>
+          <a:lstStyle/>
+          <a:p>
+            <a:r>
+              <a:rPr lang="it-IT" dirty="0"/>
+              <a:t>Y</a:t>
+            </a:r>
+          </a:p>
+        </p:txBody>
+      </p:sp>
+      <p:cxnSp>
+        <p:nvCxnSpPr>
+          <p:cNvPr id="19" name="Connettore 2 18">
+            <a:extLst>
+              <a:ext uri="{FF2B5EF4-FFF2-40B4-BE49-F238E27FC236}">
+                <a16:creationId xmlns:a16="http://schemas.microsoft.com/office/drawing/2014/main" id="{06FC4CEA-C691-3B6B-E987-B5D53F3BAB7F}"/>
+              </a:ext>
+            </a:extLst>
+          </p:cNvPr>
+          <p:cNvCxnSpPr/>
+          <p:nvPr/>
+        </p:nvCxnSpPr>
+        <p:spPr>
+          <a:xfrm>
+            <a:off x="10081258" y="4478442"/>
+            <a:ext cx="0" cy="882124"/>
+          </a:xfrm>
+          <a:prstGeom prst="straightConnector1">
+            <a:avLst/>
+          </a:prstGeom>
+          <a:ln>
+            <a:tailEnd type="triangle"/>
+          </a:ln>
+        </p:spPr>
+        <p:style>
+          <a:lnRef idx="1">
+            <a:schemeClr val="accent2"/>
+          </a:lnRef>
+          <a:fillRef idx="0">
+            <a:schemeClr val="accent2"/>
+          </a:fillRef>
+          <a:effectRef idx="0">
+            <a:schemeClr val="accent2"/>
+          </a:effectRef>
+          <a:fontRef idx="minor">
+            <a:schemeClr val="tx1"/>
+          </a:fontRef>
+        </p:style>
+      </p:cxnSp>
+      <p:sp>
+        <p:nvSpPr>
+          <p:cNvPr id="20" name="CasellaDiTesto 19">
+            <a:extLst>
+              <a:ext uri="{FF2B5EF4-FFF2-40B4-BE49-F238E27FC236}">
+                <a16:creationId xmlns:a16="http://schemas.microsoft.com/office/drawing/2014/main" id="{7330AE49-DA80-17EE-B595-351B853BF94A}"/>
+              </a:ext>
+            </a:extLst>
+          </p:cNvPr>
+          <p:cNvSpPr txBox="1"/>
+          <p:nvPr/>
+        </p:nvSpPr>
+        <p:spPr>
+          <a:xfrm>
+            <a:off x="9791551" y="4663108"/>
+            <a:ext cx="450036" cy="369332"/>
+          </a:xfrm>
+          <a:prstGeom prst="rect">
+            <a:avLst/>
+          </a:prstGeom>
+          <a:noFill/>
+        </p:spPr>
+        <p:txBody>
+          <a:bodyPr wrap="square" rtlCol="0">
+            <a:spAutoFit/>
+          </a:bodyPr>
+          <a:lstStyle/>
+          <a:p>
+            <a:r>
+              <a:rPr lang="it-IT" dirty="0"/>
+              <a:t>g</a:t>
+            </a:r>
+          </a:p>
+        </p:txBody>
+      </p:sp>
+      <p:cxnSp>
+        <p:nvCxnSpPr>
+          <p:cNvPr id="22" name="Connettore 2 21">
+            <a:extLst>
+              <a:ext uri="{FF2B5EF4-FFF2-40B4-BE49-F238E27FC236}">
+                <a16:creationId xmlns:a16="http://schemas.microsoft.com/office/drawing/2014/main" id="{DAD3555F-2A8C-48FB-6429-0A59E8729557}"/>
+              </a:ext>
+            </a:extLst>
+          </p:cNvPr>
+          <p:cNvCxnSpPr>
+            <a:cxnSpLocks/>
+          </p:cNvCxnSpPr>
+          <p:nvPr/>
+        </p:nvCxnSpPr>
+        <p:spPr>
+          <a:xfrm flipH="1" flipV="1">
+            <a:off x="9695625" y="3948985"/>
+            <a:ext cx="385633" cy="529457"/>
+          </a:xfrm>
+          <a:prstGeom prst="straightConnector1">
+            <a:avLst/>
+          </a:prstGeom>
+          <a:ln>
+            <a:tailEnd type="triangle"/>
+          </a:ln>
+        </p:spPr>
+        <p:style>
+          <a:lnRef idx="1">
+            <a:schemeClr val="accent1"/>
+          </a:lnRef>
+          <a:fillRef idx="0">
+            <a:schemeClr val="accent1"/>
+          </a:fillRef>
+          <a:effectRef idx="0">
+            <a:schemeClr val="accent1"/>
+          </a:effectRef>
+          <a:fontRef idx="minor">
+            <a:schemeClr val="tx1"/>
+          </a:fontRef>
+        </p:style>
+      </p:cxnSp>
+      <p:sp>
+        <p:nvSpPr>
+          <p:cNvPr id="23" name="CasellaDiTesto 22">
+            <a:extLst>
+              <a:ext uri="{FF2B5EF4-FFF2-40B4-BE49-F238E27FC236}">
+                <a16:creationId xmlns:a16="http://schemas.microsoft.com/office/drawing/2014/main" id="{9F6F6529-79AA-D7C3-CC73-A7340BDA2E88}"/>
+              </a:ext>
+            </a:extLst>
+          </p:cNvPr>
+          <p:cNvSpPr txBox="1"/>
+          <p:nvPr/>
+        </p:nvSpPr>
+        <p:spPr>
+          <a:xfrm>
+            <a:off x="9013972" y="3963009"/>
+            <a:ext cx="746620" cy="307777"/>
+          </a:xfrm>
+          <a:prstGeom prst="rect">
+            <a:avLst/>
+          </a:prstGeom>
+          <a:noFill/>
+        </p:spPr>
+        <p:txBody>
+          <a:bodyPr wrap="square" rtlCol="0">
+            <a:spAutoFit/>
+          </a:bodyPr>
+          <a:lstStyle/>
+          <a:p>
+            <a:r>
+              <a:rPr lang="it-IT" sz="1400" dirty="0" err="1"/>
+              <a:t>accZ</a:t>
+            </a:r>
+            <a:endParaRPr lang="it-IT" sz="1400" dirty="0"/>
+          </a:p>
+        </p:txBody>
+      </p:sp>
+      <p:cxnSp>
+        <p:nvCxnSpPr>
+          <p:cNvPr id="25" name="Connettore 2 24">
+            <a:extLst>
+              <a:ext uri="{FF2B5EF4-FFF2-40B4-BE49-F238E27FC236}">
+                <a16:creationId xmlns:a16="http://schemas.microsoft.com/office/drawing/2014/main" id="{1D704431-0936-F2FD-0168-008A29F375C9}"/>
+              </a:ext>
+            </a:extLst>
+          </p:cNvPr>
+          <p:cNvCxnSpPr>
+            <a:cxnSpLocks/>
+          </p:cNvCxnSpPr>
+          <p:nvPr/>
+        </p:nvCxnSpPr>
+        <p:spPr>
+          <a:xfrm flipV="1">
+            <a:off x="10081258" y="4213713"/>
+            <a:ext cx="320666" cy="266009"/>
+          </a:xfrm>
+          <a:prstGeom prst="straightConnector1">
+            <a:avLst/>
+          </a:prstGeom>
+          <a:ln>
+            <a:tailEnd type="triangle"/>
+          </a:ln>
+        </p:spPr>
+        <p:style>
+          <a:lnRef idx="1">
+            <a:schemeClr val="accent1"/>
+          </a:lnRef>
+          <a:fillRef idx="0">
+            <a:schemeClr val="accent1"/>
+          </a:fillRef>
+          <a:effectRef idx="0">
+            <a:schemeClr val="accent1"/>
+          </a:effectRef>
+          <a:fontRef idx="minor">
+            <a:schemeClr val="tx1"/>
+          </a:fontRef>
+        </p:style>
+      </p:cxnSp>
+      <p:sp>
+        <p:nvSpPr>
+          <p:cNvPr id="28" name="CasellaDiTesto 27">
+            <a:extLst>
+              <a:ext uri="{FF2B5EF4-FFF2-40B4-BE49-F238E27FC236}">
+                <a16:creationId xmlns:a16="http://schemas.microsoft.com/office/drawing/2014/main" id="{1F47AF11-8311-30B2-EB8A-BEE6BDF8FE35}"/>
+              </a:ext>
+            </a:extLst>
+          </p:cNvPr>
+          <p:cNvSpPr txBox="1"/>
+          <p:nvPr/>
+        </p:nvSpPr>
+        <p:spPr>
+          <a:xfrm>
+            <a:off x="10195594" y="3845662"/>
+            <a:ext cx="746620" cy="307777"/>
+          </a:xfrm>
+          <a:prstGeom prst="rect">
+            <a:avLst/>
+          </a:prstGeom>
+          <a:noFill/>
+        </p:spPr>
+        <p:txBody>
+          <a:bodyPr wrap="square" rtlCol="0">
+            <a:spAutoFit/>
+          </a:bodyPr>
+          <a:lstStyle/>
+          <a:p>
+            <a:r>
+              <a:rPr lang="it-IT" sz="1400" dirty="0" err="1"/>
+              <a:t>accY</a:t>
+            </a:r>
+            <a:endParaRPr lang="it-IT" sz="1400" dirty="0"/>
+          </a:p>
+        </p:txBody>
+      </p:sp>
+      <p:sp>
+        <p:nvSpPr>
+          <p:cNvPr id="29" name="Arco 28">
+            <a:extLst>
+              <a:ext uri="{FF2B5EF4-FFF2-40B4-BE49-F238E27FC236}">
+                <a16:creationId xmlns:a16="http://schemas.microsoft.com/office/drawing/2014/main" id="{A7592F53-11F1-1504-B9CB-F07D4A960D0F}"/>
+              </a:ext>
+            </a:extLst>
+          </p:cNvPr>
+          <p:cNvSpPr/>
+          <p:nvPr/>
+        </p:nvSpPr>
+        <p:spPr>
+          <a:xfrm>
+            <a:off x="10241590" y="4282281"/>
+            <a:ext cx="160331" cy="392322"/>
+          </a:xfrm>
+          <a:prstGeom prst="arc">
+            <a:avLst/>
+          </a:prstGeom>
+        </p:spPr>
+        <p:style>
+          <a:lnRef idx="1">
+            <a:schemeClr val="accent1"/>
+          </a:lnRef>
+          <a:fillRef idx="0">
+            <a:schemeClr val="accent1"/>
+          </a:fillRef>
+          <a:effectRef idx="0">
+            <a:schemeClr val="accent1"/>
+          </a:effectRef>
+          <a:fontRef idx="minor">
+            <a:schemeClr val="tx1"/>
+          </a:fontRef>
+        </p:style>
+        <p:txBody>
+          <a:bodyPr rtlCol="0" anchor="ctr"/>
+          <a:lstStyle/>
+          <a:p>
+            <a:pPr algn="ctr"/>
+            <a:endParaRPr lang="it-IT"/>
+          </a:p>
+        </p:txBody>
+      </p:sp>
+      <p:sp>
+        <p:nvSpPr>
+          <p:cNvPr id="30" name="CasellaDiTesto 29">
+            <a:extLst>
+              <a:ext uri="{FF2B5EF4-FFF2-40B4-BE49-F238E27FC236}">
+                <a16:creationId xmlns:a16="http://schemas.microsoft.com/office/drawing/2014/main" id="{16CC6918-26BC-E2C2-E1B6-A3F95E1D2786}"/>
+              </a:ext>
+            </a:extLst>
+          </p:cNvPr>
+          <p:cNvSpPr txBox="1"/>
+          <p:nvPr/>
+        </p:nvSpPr>
+        <p:spPr>
+          <a:xfrm>
+            <a:off x="10401921" y="4213713"/>
+            <a:ext cx="450029" cy="369329"/>
+          </a:xfrm>
+          <a:prstGeom prst="rect">
+            <a:avLst/>
+          </a:prstGeom>
+          <a:noFill/>
+        </p:spPr>
+        <p:txBody>
+          <a:bodyPr wrap="square" rtlCol="0">
+            <a:spAutoFit/>
+          </a:bodyPr>
+          <a:lstStyle/>
+          <a:p>
+            <a:r>
+              <a:rPr lang="it-IT" dirty="0">
+                <a:latin typeface="Times New Roman" panose="02020603050405020304" pitchFamily="18" charset="0"/>
+                <a:cs typeface="Times New Roman" panose="02020603050405020304" pitchFamily="18" charset="0"/>
+              </a:rPr>
+              <a:t>ᶿ</a:t>
+            </a:r>
+            <a:endParaRPr lang="it-IT" dirty="0"/>
+          </a:p>
+        </p:txBody>
+      </p:sp>
+    </p:spTree>
+    <p:extLst>
+      <p:ext uri="{BB962C8B-B14F-4D97-AF65-F5344CB8AC3E}">
+        <p14:creationId xmlns:p14="http://schemas.microsoft.com/office/powerpoint/2010/main" val="2089746602"/>
+      </p:ext>
+    </p:extLst>
+  </p:cSld>
+  <p:clrMapOvr>
+    <a:masterClrMapping/>
+  </p:clrMapOvr>
+</p:sld>
+</file>
+
+<file path=ppt/slides/slide8.xml><?xml version="1.0" encoding="utf-8"?>
+<p:sld xmlns:a="http://schemas.openxmlformats.org/drawingml/2006/main" xmlns:r="http://schemas.openxmlformats.org/officeDocument/2006/relationships" xmlns:p="http://schemas.openxmlformats.org/presentationml/2006/main">
+  <p:cSld>
+    <p:bg>
+      <p:bgPr>
+        <a:solidFill>
+          <a:schemeClr val="bg1"/>
+        </a:solidFill>
+        <a:effectLst/>
+      </p:bgPr>
+    </p:bg>
+    <p:spTree>
+      <p:nvGrpSpPr>
+        <p:cNvPr id="1" name=""/>
+        <p:cNvGrpSpPr/>
+        <p:nvPr/>
+      </p:nvGrpSpPr>
+      <p:grpSpPr>
+        <a:xfrm>
+          <a:off x="0" y="0"/>
+          <a:ext cx="0" cy="0"/>
+          <a:chOff x="0" y="0"/>
+          <a:chExt cx="0" cy="0"/>
+        </a:xfrm>
+      </p:grpSpPr>
+      <p:sp useBgFill="1">
+        <p:nvSpPr>
+          <p:cNvPr id="8" name="Rectangle 7">
+            <a:extLst>
+              <a:ext uri="{FF2B5EF4-FFF2-40B4-BE49-F238E27FC236}">
+                <a16:creationId xmlns:a16="http://schemas.microsoft.com/office/drawing/2014/main" id="{1B15ED52-F352-441B-82BF-E0EA34836D08}"/>
+              </a:ext>
+              <a:ext uri="{C183D7F6-B498-43B3-948B-1728B52AA6E4}">
+                <adec:decorative xmlns:adec="http://schemas.microsoft.com/office/drawing/2017/decorative" val="1"/>
+              </a:ext>
+            </a:extLst>
+          </p:cNvPr>
+          <p:cNvSpPr>
+            <a:spLocks noGrp="1" noRot="1" noChangeAspect="1" noMove="1" noResize="1" noEditPoints="1" noAdjustHandles="1" noChangeArrowheads="1" noChangeShapeType="1" noTextEdit="1"/>
+          </p:cNvSpPr>
+          <p:nvPr>
+            <p:extLst>
+              <p:ext uri="{386F3935-93C4-4BCD-93E2-E3B085C9AB24}">
+                <p16:designElem xmlns:p16="http://schemas.microsoft.com/office/powerpoint/2015/main" val="1"/>
+              </p:ext>
+            </p:extLst>
+          </p:nvPr>
+        </p:nvSpPr>
+        <p:spPr>
+          <a:xfrm>
+            <a:off x="0" y="0"/>
+            <a:ext cx="12192000" cy="6858000"/>
+          </a:xfrm>
+          <a:prstGeom prst="rect">
+            <a:avLst/>
+          </a:prstGeom>
+          <a:ln w="12700" cap="flat" cmpd="sng" algn="ctr">
+            <a:noFill/>
+            <a:prstDash val="solid"/>
+            <a:miter lim="800000"/>
+          </a:ln>
+          <a:effectLst/>
+          <a:extLst>
+            <a:ext uri="{91240B29-F687-4F45-9708-019B960494DF}">
+              <a14:hiddenLine xmlns:a14="http://schemas.microsoft.com/office/drawing/2010/main" w="12700" cap="flat" cmpd="sng" algn="ctr">
+                <a:solidFill>
+                  <a:schemeClr val="accent1">
+                    <a:shade val="50000"/>
+                  </a:schemeClr>
+                </a:solidFill>
+                <a:prstDash val="solid"/>
+                <a:miter lim="800000"/>
+              </a14:hiddenLine>
+            </a:ext>
+          </a:extLst>
+        </p:spPr>
+        <p:style>
+          <a:lnRef idx="2">
+            <a:schemeClr val="accent1">
+              <a:shade val="50000"/>
+            </a:schemeClr>
+          </a:lnRef>
+          <a:fillRef idx="1">
+            <a:schemeClr val="accent1"/>
+          </a:fillRef>
+          <a:effectRef idx="0">
+            <a:schemeClr val="accent1"/>
+          </a:effectRef>
+          <a:fontRef idx="minor">
+            <a:schemeClr val="lt1"/>
+          </a:fontRef>
+        </p:style>
+        <p:txBody>
+          <a:bodyPr rtlCol="0" anchor="ctr"/>
+          <a:lstStyle/>
+          <a:p>
+            <a:pPr algn="ctr"/>
+            <a:endParaRPr lang="en-US"/>
+          </a:p>
+        </p:txBody>
+      </p:sp>
+      <p:sp>
+        <p:nvSpPr>
+          <p:cNvPr id="10" name="Rectangle 9">
+            <a:extLst>
+              <a:ext uri="{FF2B5EF4-FFF2-40B4-BE49-F238E27FC236}">
+                <a16:creationId xmlns:a16="http://schemas.microsoft.com/office/drawing/2014/main" id="{3B2E3793-BFE6-45A2-9B7B-E18844431C99}"/>
+              </a:ext>
+              <a:ext uri="{C183D7F6-B498-43B3-948B-1728B52AA6E4}">
+                <adec:decorative xmlns:adec="http://schemas.microsoft.com/office/drawing/2017/decorative" val="1"/>
+              </a:ext>
+            </a:extLst>
+          </p:cNvPr>
+          <p:cNvSpPr>
+            <a:spLocks noGrp="1" noRot="1" noChangeAspect="1" noMove="1" noResize="1" noEditPoints="1" noAdjustHandles="1" noChangeArrowheads="1" noChangeShapeType="1" noTextEdit="1"/>
+          </p:cNvSpPr>
+          <p:nvPr>
+            <p:extLst>
+              <p:ext uri="{386F3935-93C4-4BCD-93E2-E3B085C9AB24}">
+                <p16:designElem xmlns:p16="http://schemas.microsoft.com/office/powerpoint/2015/main" val="1"/>
+              </p:ext>
+            </p:extLst>
+          </p:nvPr>
+        </p:nvSpPr>
+        <p:spPr>
+          <a:xfrm flipH="1">
+            <a:off x="-1" y="-1"/>
+            <a:ext cx="12191998" cy="1590742"/>
+          </a:xfrm>
+          <a:prstGeom prst="rect">
+            <a:avLst/>
+          </a:prstGeom>
+          <a:gradFill>
+            <a:gsLst>
+              <a:gs pos="0">
+                <a:srgbClr val="000000"/>
+              </a:gs>
+              <a:gs pos="100000">
+                <a:schemeClr val="accent1">
+                  <a:lumMod val="75000"/>
+                </a:schemeClr>
+              </a:gs>
+            </a:gsLst>
+            <a:lin ang="8400000" scaled="0"/>
+          </a:gradFill>
+          <a:ln>
+            <a:noFill/>
+          </a:ln>
+        </p:spPr>
+        <p:style>
+          <a:lnRef idx="2">
+            <a:schemeClr val="accent1">
+              <a:shade val="50000"/>
+            </a:schemeClr>
+          </a:lnRef>
+          <a:fillRef idx="1">
+            <a:schemeClr val="accent1"/>
+          </a:fillRef>
+          <a:effectRef idx="0">
+            <a:schemeClr val="accent1"/>
+          </a:effectRef>
+          <a:fontRef idx="minor">
+            <a:schemeClr val="lt1"/>
+          </a:fontRef>
+        </p:style>
+        <p:txBody>
+          <a:bodyPr rtlCol="0" anchor="ctr"/>
+          <a:lstStyle/>
+          <a:p>
+            <a:pPr algn="ctr"/>
+            <a:endParaRPr lang="en-US"/>
+          </a:p>
+        </p:txBody>
+      </p:sp>
+      <p:sp>
+        <p:nvSpPr>
+          <p:cNvPr id="12" name="Rectangle 11">
+            <a:extLst>
+              <a:ext uri="{FF2B5EF4-FFF2-40B4-BE49-F238E27FC236}">
+                <a16:creationId xmlns:a16="http://schemas.microsoft.com/office/drawing/2014/main" id="{BC4C4868-CB8F-4AF9-9CDB-8108F2C19B67}"/>
+              </a:ext>
+              <a:ext uri="{C183D7F6-B498-43B3-948B-1728B52AA6E4}">
+                <adec:decorative xmlns:adec="http://schemas.microsoft.com/office/drawing/2017/decorative" val="1"/>
+              </a:ext>
+            </a:extLst>
+          </p:cNvPr>
+          <p:cNvSpPr>
+            <a:spLocks noGrp="1" noRot="1" noChangeAspect="1" noMove="1" noResize="1" noEditPoints="1" noAdjustHandles="1" noChangeArrowheads="1" noChangeShapeType="1" noTextEdit="1"/>
+          </p:cNvSpPr>
+          <p:nvPr>
+            <p:extLst>
+              <p:ext uri="{386F3935-93C4-4BCD-93E2-E3B085C9AB24}">
+                <p16:designElem xmlns:p16="http://schemas.microsoft.com/office/powerpoint/2015/main" val="1"/>
+              </p:ext>
+            </p:extLst>
+          </p:nvPr>
+        </p:nvSpPr>
+        <p:spPr>
+          <a:xfrm rot="10800000" flipH="1">
+            <a:off x="-3" y="0"/>
+            <a:ext cx="8115306" cy="1590742"/>
+          </a:xfrm>
+          <a:prstGeom prst="rect">
+            <a:avLst/>
+          </a:prstGeom>
+          <a:gradFill>
+            <a:gsLst>
+              <a:gs pos="20000">
+                <a:schemeClr val="accent1">
+                  <a:alpha val="0"/>
+                </a:schemeClr>
+              </a:gs>
+              <a:gs pos="100000">
+                <a:schemeClr val="accent1">
+                  <a:lumMod val="50000"/>
+                  <a:alpha val="55000"/>
+                </a:schemeClr>
+              </a:gs>
+            </a:gsLst>
+            <a:lin ang="13800000" scaled="0"/>
+          </a:gradFill>
+          <a:ln>
+            <a:noFill/>
+          </a:ln>
+        </p:spPr>
+        <p:style>
+          <a:lnRef idx="2">
+            <a:schemeClr val="accent1">
+              <a:shade val="50000"/>
+            </a:schemeClr>
+          </a:lnRef>
+          <a:fillRef idx="1">
+            <a:schemeClr val="accent1"/>
+          </a:fillRef>
+          <a:effectRef idx="0">
+            <a:schemeClr val="accent1"/>
+          </a:effectRef>
+          <a:fontRef idx="minor">
+            <a:schemeClr val="lt1"/>
+          </a:fontRef>
+        </p:style>
+        <p:txBody>
+          <a:bodyPr rtlCol="0" anchor="ctr"/>
+          <a:lstStyle/>
+          <a:p>
+            <a:pPr algn="ctr"/>
+            <a:endParaRPr lang="en-US"/>
+          </a:p>
+        </p:txBody>
+      </p:sp>
+      <p:sp>
+        <p:nvSpPr>
+          <p:cNvPr id="14" name="Rectangle 13">
+            <a:extLst>
+              <a:ext uri="{FF2B5EF4-FFF2-40B4-BE49-F238E27FC236}">
+                <a16:creationId xmlns:a16="http://schemas.microsoft.com/office/drawing/2014/main" id="{375E0459-6403-40CD-989D-56A4407CA12E}"/>
+              </a:ext>
+              <a:ext uri="{C183D7F6-B498-43B3-948B-1728B52AA6E4}">
+                <adec:decorative xmlns:adec="http://schemas.microsoft.com/office/drawing/2017/decorative" val="1"/>
+              </a:ext>
+            </a:extLst>
+          </p:cNvPr>
+          <p:cNvSpPr>
+            <a:spLocks noGrp="1" noRot="1" noChangeAspect="1" noMove="1" noResize="1" noEditPoints="1" noAdjustHandles="1" noChangeArrowheads="1" noChangeShapeType="1" noTextEdit="1"/>
+          </p:cNvSpPr>
+          <p:nvPr>
+            <p:extLst>
+              <p:ext uri="{386F3935-93C4-4BCD-93E2-E3B085C9AB24}">
+                <p16:designElem xmlns:p16="http://schemas.microsoft.com/office/powerpoint/2015/main" val="1"/>
+              </p:ext>
+            </p:extLst>
+          </p:nvPr>
+        </p:nvSpPr>
+        <p:spPr>
+          <a:xfrm flipH="1">
+            <a:off x="8115299" y="-1"/>
+            <a:ext cx="4076698" cy="1590742"/>
+          </a:xfrm>
+          <a:prstGeom prst="rect">
+            <a:avLst/>
+          </a:prstGeom>
+          <a:gradFill>
+            <a:gsLst>
+              <a:gs pos="0">
+                <a:schemeClr val="accent1">
+                  <a:alpha val="66000"/>
+                </a:schemeClr>
+              </a:gs>
+              <a:gs pos="100000">
+                <a:srgbClr val="000000">
+                  <a:alpha val="30000"/>
+                </a:srgbClr>
+              </a:gs>
+            </a:gsLst>
+            <a:lin ang="13200000" scaled="0"/>
+          </a:gradFill>
+          <a:ln>
+            <a:noFill/>
+          </a:ln>
+        </p:spPr>
+        <p:style>
+          <a:lnRef idx="2">
+            <a:schemeClr val="accent1">
+              <a:shade val="50000"/>
+            </a:schemeClr>
+          </a:lnRef>
+          <a:fillRef idx="1">
+            <a:schemeClr val="accent1"/>
+          </a:fillRef>
+          <a:effectRef idx="0">
+            <a:schemeClr val="accent1"/>
+          </a:effectRef>
+          <a:fontRef idx="minor">
+            <a:schemeClr val="lt1"/>
+          </a:fontRef>
+        </p:style>
+        <p:txBody>
+          <a:bodyPr rtlCol="0" anchor="ctr"/>
+          <a:lstStyle/>
+          <a:p>
+            <a:pPr algn="ctr"/>
+            <a:endParaRPr lang="en-US"/>
+          </a:p>
+        </p:txBody>
+      </p:sp>
+      <p:sp>
+        <p:nvSpPr>
+          <p:cNvPr id="16" name="Rectangle 15">
+            <a:extLst>
+              <a:ext uri="{FF2B5EF4-FFF2-40B4-BE49-F238E27FC236}">
+                <a16:creationId xmlns:a16="http://schemas.microsoft.com/office/drawing/2014/main" id="{53E5B1A8-3AC9-4BD1-9BBC-78CA94F2D1BA}"/>
+              </a:ext>
+              <a:ext uri="{C183D7F6-B498-43B3-948B-1728B52AA6E4}">
+                <adec:decorative xmlns:adec="http://schemas.microsoft.com/office/drawing/2017/decorative" val="1"/>
+              </a:ext>
+            </a:extLst>
+          </p:cNvPr>
+          <p:cNvSpPr>
+            <a:spLocks noGrp="1" noRot="1" noChangeAspect="1" noMove="1" noResize="1" noEditPoints="1" noAdjustHandles="1" noChangeArrowheads="1" noChangeShapeType="1" noTextEdit="1"/>
+          </p:cNvSpPr>
+          <p:nvPr>
+            <p:extLst>
+              <p:ext uri="{386F3935-93C4-4BCD-93E2-E3B085C9AB24}">
+                <p16:designElem xmlns:p16="http://schemas.microsoft.com/office/powerpoint/2015/main" val="1"/>
+              </p:ext>
+            </p:extLst>
+          </p:nvPr>
+        </p:nvSpPr>
+        <p:spPr>
+          <a:xfrm>
+            <a:off x="459350" y="-1"/>
+            <a:ext cx="11732646" cy="1597433"/>
+          </a:xfrm>
+          <a:prstGeom prst="rect">
+            <a:avLst/>
+          </a:prstGeom>
+          <a:gradFill>
+            <a:gsLst>
+              <a:gs pos="50000">
+                <a:srgbClr val="000000">
+                  <a:alpha val="0"/>
+                </a:srgbClr>
+              </a:gs>
+              <a:gs pos="99000">
+                <a:schemeClr val="accent1">
+                  <a:lumMod val="50000"/>
+                  <a:alpha val="52000"/>
+                </a:schemeClr>
+              </a:gs>
+            </a:gsLst>
+            <a:lin ang="16800000" scaled="0"/>
+          </a:gradFill>
+          <a:ln>
+            <a:noFill/>
+          </a:ln>
+        </p:spPr>
+        <p:style>
+          <a:lnRef idx="2">
+            <a:schemeClr val="accent1">
+              <a:shade val="50000"/>
+            </a:schemeClr>
+          </a:lnRef>
+          <a:fillRef idx="1">
+            <a:schemeClr val="accent1"/>
+          </a:fillRef>
+          <a:effectRef idx="0">
+            <a:schemeClr val="accent1"/>
+          </a:effectRef>
+          <a:fontRef idx="minor">
+            <a:schemeClr val="lt1"/>
+          </a:fontRef>
+        </p:style>
+        <p:txBody>
+          <a:bodyPr rtlCol="0" anchor="ctr"/>
+          <a:lstStyle/>
+          <a:p>
+            <a:pPr algn="ctr"/>
+            <a:endParaRPr lang="en-US"/>
+          </a:p>
+        </p:txBody>
+      </p:sp>
+      <p:sp>
+        <p:nvSpPr>
+          <p:cNvPr id="2" name="Titolo 1">
+            <a:extLst>
+              <a:ext uri="{FF2B5EF4-FFF2-40B4-BE49-F238E27FC236}">
+                <a16:creationId xmlns:a16="http://schemas.microsoft.com/office/drawing/2014/main" id="{2EF822A0-8E91-B721-F83E-102D0283FFA0}"/>
+              </a:ext>
+            </a:extLst>
+          </p:cNvPr>
+          <p:cNvSpPr>
+            <a:spLocks noGrp="1"/>
+          </p:cNvSpPr>
+          <p:nvPr>
+            <p:ph type="title"/>
+          </p:nvPr>
+        </p:nvSpPr>
+        <p:spPr>
+          <a:xfrm>
+            <a:off x="1371599" y="294538"/>
+            <a:ext cx="9895951" cy="1033669"/>
+          </a:xfrm>
+        </p:spPr>
+        <p:txBody>
+          <a:bodyPr>
+            <a:normAutofit/>
+          </a:bodyPr>
+          <a:lstStyle/>
+          <a:p>
+            <a:r>
+              <a:rPr lang="it-IT" sz="4000" dirty="0">
+                <a:solidFill>
+                  <a:srgbClr val="FFFFFF"/>
+                </a:solidFill>
+              </a:rPr>
+              <a:t>Il filtro complementare e l’angolo di piega</a:t>
+            </a:r>
+          </a:p>
+        </p:txBody>
+      </p:sp>
+      <mc:AlternateContent xmlns:mc="http://schemas.openxmlformats.org/markup-compatibility/2006">
+        <mc:Choice xmlns:a14="http://schemas.microsoft.com/office/drawing/2010/main" Requires="a14">
+          <p:sp>
+            <p:nvSpPr>
+              <p:cNvPr id="3" name="Segnaposto contenuto 2">
+                <a:extLst>
+                  <a:ext uri="{FF2B5EF4-FFF2-40B4-BE49-F238E27FC236}">
+                    <a16:creationId xmlns:a16="http://schemas.microsoft.com/office/drawing/2014/main" id="{6DFE9166-79A3-9F8B-1B2F-77C6227C0727}"/>
+                  </a:ext>
+                </a:extLst>
+              </p:cNvPr>
+              <p:cNvSpPr>
+                <a:spLocks noGrp="1"/>
+              </p:cNvSpPr>
+              <p:nvPr>
+                <p:ph idx="1"/>
+              </p:nvPr>
+            </p:nvSpPr>
+            <p:spPr>
+              <a:xfrm>
+                <a:off x="1371599" y="2318197"/>
+                <a:ext cx="9724031" cy="3683358"/>
+              </a:xfrm>
+            </p:spPr>
+            <p:txBody>
+              <a:bodyPr anchor="ctr">
+                <a:normAutofit lnSpcReduction="10000"/>
+              </a:bodyPr>
+              <a:lstStyle/>
+              <a:p>
+                <a:r>
+                  <a:rPr lang="it-IT" dirty="0"/>
+                  <a:t>Utilizziamo il filtro complementare per combinare i valori ottenuti dai due sensori. L’utilizzo dei due sensori permette infatti di ottenere una misurazione accurata dell’angolo, eliminando le criticità introdotte dai due sensori.</a:t>
+                </a:r>
+              </a:p>
+              <a:p>
+                <a:r>
+                  <a:rPr lang="it-IT" dirty="0"/>
+                  <a:t>Nella pratica sommiamo i due valori ottenuti attraverso i due metodi di calcolo, prediligendo i valori ottenuti dal giroscopio:</a:t>
+                </a:r>
+              </a:p>
+              <a:p>
+                <a:pPr marL="0" indent="0">
+                  <a:buNone/>
+                </a:pPr>
+                <a14:m>
+                  <m:oMathPara xmlns:m="http://schemas.openxmlformats.org/officeDocument/2006/math">
+                    <m:oMathParaPr>
+                      <m:jc m:val="centerGroup"/>
+                    </m:oMathParaPr>
+                    <m:oMath xmlns:m="http://schemas.openxmlformats.org/officeDocument/2006/math">
+                      <m:sSub>
+                        <m:sSubPr>
+                          <m:ctrlPr>
+                            <a:rPr lang="it-IT" b="0" i="1" smtClean="0">
+                              <a:latin typeface="Cambria Math" panose="02040503050406030204" pitchFamily="18" charset="0"/>
+                            </a:rPr>
+                          </m:ctrlPr>
+                        </m:sSubPr>
+                        <m:e>
+                          <m:r>
+                            <a:rPr lang="it-IT" b="0" i="1" smtClean="0">
+                              <a:latin typeface="Cambria Math" panose="02040503050406030204" pitchFamily="18" charset="0"/>
+                            </a:rPr>
+                            <m:t>𝜃</m:t>
+                          </m:r>
+                        </m:e>
+                        <m:sub>
+                          <m:r>
+                            <a:rPr lang="it-IT" b="0" i="1" smtClean="0">
+                              <a:latin typeface="Cambria Math" panose="02040503050406030204" pitchFamily="18" charset="0"/>
+                            </a:rPr>
+                            <m:t>𝑓𝑖𝑛𝑎𝑙</m:t>
+                          </m:r>
+                        </m:sub>
+                      </m:sSub>
+                      <m:r>
+                        <a:rPr lang="it-IT" b="0" i="1" smtClean="0">
+                          <a:latin typeface="Cambria Math" panose="02040503050406030204" pitchFamily="18" charset="0"/>
+                        </a:rPr>
+                        <m:t>=0.95∗</m:t>
+                      </m:r>
+                      <m:sSub>
+                        <m:sSubPr>
+                          <m:ctrlPr>
+                            <a:rPr lang="it-IT" b="0" i="1" smtClean="0">
+                              <a:latin typeface="Cambria Math" panose="02040503050406030204" pitchFamily="18" charset="0"/>
+                            </a:rPr>
+                          </m:ctrlPr>
+                        </m:sSubPr>
+                        <m:e>
+                          <m:r>
+                            <a:rPr lang="it-IT" b="0" i="1" smtClean="0">
+                              <a:latin typeface="Cambria Math" panose="02040503050406030204" pitchFamily="18" charset="0"/>
+                            </a:rPr>
+                            <m:t>𝜃</m:t>
+                          </m:r>
+                        </m:e>
+                        <m:sub>
+                          <m:r>
+                            <a:rPr lang="it-IT" b="0" i="1" smtClean="0">
+                              <a:latin typeface="Cambria Math" panose="02040503050406030204" pitchFamily="18" charset="0"/>
+                            </a:rPr>
+                            <m:t>𝑔𝑦𝑟𝑜</m:t>
+                          </m:r>
+                        </m:sub>
+                      </m:sSub>
+                      <m:r>
+                        <a:rPr lang="it-IT" b="0" i="1" smtClean="0">
+                          <a:latin typeface="Cambria Math" panose="02040503050406030204" pitchFamily="18" charset="0"/>
+                        </a:rPr>
+                        <m:t>+0.05 ∗</m:t>
+                      </m:r>
+                      <m:sSub>
+                        <m:sSubPr>
+                          <m:ctrlPr>
+                            <a:rPr lang="it-IT" b="0" i="1" smtClean="0">
+                              <a:latin typeface="Cambria Math" panose="02040503050406030204" pitchFamily="18" charset="0"/>
+                            </a:rPr>
+                          </m:ctrlPr>
+                        </m:sSubPr>
+                        <m:e>
+                          <m:r>
+                            <a:rPr lang="it-IT" b="0" i="1" smtClean="0">
+                              <a:latin typeface="Cambria Math" panose="02040503050406030204" pitchFamily="18" charset="0"/>
+                            </a:rPr>
+                            <m:t>𝜃</m:t>
+                          </m:r>
+                        </m:e>
+                        <m:sub>
+                          <m:r>
+                            <a:rPr lang="it-IT" b="0" i="1" smtClean="0">
+                              <a:latin typeface="Cambria Math" panose="02040503050406030204" pitchFamily="18" charset="0"/>
+                            </a:rPr>
+                            <m:t>𝑎𝑐𝑐𝑒𝑙</m:t>
+                          </m:r>
+                        </m:sub>
+                      </m:sSub>
+                    </m:oMath>
+                  </m:oMathPara>
+                </a14:m>
+                <a:endParaRPr lang="it-IT" dirty="0"/>
+              </a:p>
+              <a:p>
+                <a:r>
+                  <a:rPr lang="it-IT" dirty="0"/>
+                  <a:t>Aggiorniamo i valori ogni volta che uno dei due sensori aggiorna il valore.</a:t>
+                </a:r>
+              </a:p>
+            </p:txBody>
+          </p:sp>
+        </mc:Choice>
+        <mc:Fallback>
+          <p:sp>
+            <p:nvSpPr>
+              <p:cNvPr id="3" name="Segnaposto contenuto 2">
+                <a:extLst>
+                  <a:ext uri="{FF2B5EF4-FFF2-40B4-BE49-F238E27FC236}">
+                    <a16:creationId xmlns:a16="http://schemas.microsoft.com/office/drawing/2014/main" id="{6DFE9166-79A3-9F8B-1B2F-77C6227C0727}"/>
+                  </a:ext>
+                </a:extLst>
+              </p:cNvPr>
+              <p:cNvSpPr>
+                <a:spLocks noGrp="1" noRot="1" noChangeAspect="1" noMove="1" noResize="1" noEditPoints="1" noAdjustHandles="1" noChangeArrowheads="1" noChangeShapeType="1" noTextEdit="1"/>
+              </p:cNvSpPr>
+              <p:nvPr>
+                <p:ph idx="1"/>
+              </p:nvPr>
+            </p:nvSpPr>
+            <p:spPr>
+              <a:xfrm>
+                <a:off x="1371599" y="2318197"/>
+                <a:ext cx="9724031" cy="3683358"/>
+              </a:xfrm>
+              <a:blipFill>
+                <a:blip r:embed="rId2"/>
+                <a:stretch>
+                  <a:fillRect l="-1129" t="-1157" r="-1254" b="-2149"/>
+                </a:stretch>
+              </a:blipFill>
+            </p:spPr>
+            <p:txBody>
+              <a:bodyPr/>
+              <a:lstStyle/>
+              <a:p>
+                <a:r>
+                  <a:rPr lang="it-IT">
+                    <a:noFill/>
+                  </a:rPr>
+                  <a:t> </a:t>
+                </a:r>
+              </a:p>
+            </p:txBody>
+          </p:sp>
+        </mc:Fallback>
+      </mc:AlternateContent>
+    </p:spTree>
+    <p:extLst>
+      <p:ext uri="{BB962C8B-B14F-4D97-AF65-F5344CB8AC3E}">
+        <p14:creationId xmlns:p14="http://schemas.microsoft.com/office/powerpoint/2010/main" val="401503863"/>
+      </p:ext>
+    </p:extLst>
+  </p:cSld>
+  <p:clrMapOvr>
+    <a:masterClrMapping/>
+  </p:clrMapOvr>
+</p:sld>
+</file>
+
 <file path=ppt/theme/theme1.xml><?xml version="1.0" encoding="utf-8"?>
 <a:theme xmlns:a="http://schemas.openxmlformats.org/drawingml/2006/main" name="Tema di Office">
   <a:themeElements>

</xml_diff>